<commit_message>
Mid Term Presentation PPT
</commit_message>
<xml_diff>
--- a/Senior Project.pptx
+++ b/Senior Project.pptx
@@ -2,39 +2,42 @@
 <file path=ppt/presentation.xml><?xml version="1.0" encoding="utf-8"?>
 <p:presentation xmlns:a="http://schemas.openxmlformats.org/drawingml/2006/main" xmlns:r="http://schemas.openxmlformats.org/officeDocument/2006/relationships" xmlns:mc="http://schemas.openxmlformats.org/markup-compatibility/2006" xmlns:mv="urn:schemas-microsoft-com:mac:vml" xmlns:p="http://schemas.openxmlformats.org/presentationml/2006/main" xmlns:c="http://schemas.openxmlformats.org/drawingml/2006/chart" xmlns:dgm="http://schemas.openxmlformats.org/drawingml/2006/diagram" xmlns:o="urn:schemas-microsoft-com:office:office" xmlns:v="urn:schemas-microsoft-com:vml" xmlns:pvml="urn:schemas-microsoft-com:office:powerpoint" xmlns:com="http://schemas.openxmlformats.org/drawingml/2006/compatibility" xmlns:p14="http://schemas.microsoft.com/office/powerpoint/2010/main" xmlns:p15="http://schemas.microsoft.com/office/powerpoint/2012/main" autoCompressPictures="0" embedTrueTypeFonts="1" strictFirstAndLastChars="0" saveSubsetFonts="1">
   <p:sldMasterIdLst>
-    <p:sldMasterId id="2147483659" r:id="rId5"/>
+    <p:sldMasterId id="2147483659" r:id="rId4"/>
   </p:sldMasterIdLst>
   <p:notesMasterIdLst>
-    <p:notesMasterId r:id="rId6"/>
+    <p:notesMasterId r:id="rId5"/>
   </p:notesMasterIdLst>
   <p:sldIdLst>
-    <p:sldId id="256" r:id="rId7"/>
-    <p:sldId id="257" r:id="rId8"/>
-    <p:sldId id="258" r:id="rId9"/>
-    <p:sldId id="259" r:id="rId10"/>
-    <p:sldId id="260" r:id="rId11"/>
-    <p:sldId id="261" r:id="rId12"/>
-    <p:sldId id="262" r:id="rId13"/>
-    <p:sldId id="263" r:id="rId14"/>
-    <p:sldId id="264" r:id="rId15"/>
-    <p:sldId id="265" r:id="rId16"/>
+    <p:sldId id="256" r:id="rId6"/>
+    <p:sldId id="257" r:id="rId7"/>
+    <p:sldId id="258" r:id="rId8"/>
+    <p:sldId id="259" r:id="rId9"/>
+    <p:sldId id="260" r:id="rId10"/>
+    <p:sldId id="261" r:id="rId11"/>
+    <p:sldId id="262" r:id="rId12"/>
+    <p:sldId id="263" r:id="rId13"/>
+    <p:sldId id="264" r:id="rId14"/>
+    <p:sldId id="265" r:id="rId15"/>
+    <p:sldId id="266" r:id="rId16"/>
+    <p:sldId id="267" r:id="rId17"/>
+    <p:sldId id="268" r:id="rId18"/>
   </p:sldIdLst>
   <p:sldSz cy="5143500" cx="9144000"/>
   <p:notesSz cx="6858000" cy="9144000"/>
   <p:embeddedFontLst>
     <p:embeddedFont>
       <p:font typeface="Playfair Display"/>
-      <p:regular r:id="rId17"/>
-      <p:bold r:id="rId18"/>
-      <p:italic r:id="rId19"/>
-      <p:boldItalic r:id="rId20"/>
+      <p:regular r:id="rId19"/>
+      <p:bold r:id="rId20"/>
+      <p:italic r:id="rId21"/>
+      <p:boldItalic r:id="rId22"/>
     </p:embeddedFont>
     <p:embeddedFont>
       <p:font typeface="Lato"/>
-      <p:regular r:id="rId21"/>
-      <p:bold r:id="rId22"/>
-      <p:italic r:id="rId23"/>
-      <p:boldItalic r:id="rId24"/>
+      <p:regular r:id="rId23"/>
+      <p:bold r:id="rId24"/>
+      <p:italic r:id="rId25"/>
+      <p:boldItalic r:id="rId26"/>
     </p:embeddedFont>
   </p:embeddedFontLst>
   <p:defaultTextStyle>
@@ -369,7 +372,9 @@
           </a:ln>
         </p:spPr>
         <p:txBody>
-          <a:bodyPr anchorCtr="0" anchor="t" bIns="91425" lIns="91425" spcFirstLastPara="1" rIns="91425" wrap="square" tIns="91425"/>
+          <a:bodyPr anchorCtr="0" anchor="t" bIns="91425" lIns="91425" spcFirstLastPara="1" rIns="91425" wrap="square" tIns="91425">
+            <a:noAutofit/>
+          </a:bodyPr>
           <a:lstStyle>
             <a:lvl1pPr indent="-298450" lvl="0" marL="457200">
               <a:spcBef>
@@ -813,7 +818,7 @@
   <p:cSld>
     <p:spTree>
       <p:nvGrpSpPr>
-        <p:cNvPr id="111" name="Shape 111"/>
+        <p:cNvPr id="112" name="Shape 112"/>
         <p:cNvGrpSpPr/>
         <p:nvPr/>
       </p:nvGrpSpPr>
@@ -827,7 +832,7 @@
       </p:grpSpPr>
       <p:sp>
         <p:nvSpPr>
-          <p:cNvPr id="112" name="Google Shape;112;g523f01a115_0_99:notes"/>
+          <p:cNvPr id="113" name="Google Shape;113;g6fb0b8e126_0_10:notes"/>
           <p:cNvSpPr/>
           <p:nvPr>
             <p:ph idx="2" type="sldImg"/>
@@ -862,7 +867,304 @@
       </p:sp>
       <p:sp>
         <p:nvSpPr>
-          <p:cNvPr id="113" name="Google Shape;113;g523f01a115_0_99:notes"/>
+          <p:cNvPr id="114" name="Google Shape;114;g6fb0b8e126_0_10:notes"/>
+          <p:cNvSpPr txBox="1"/>
+          <p:nvPr>
+            <p:ph idx="1" type="body"/>
+          </p:nvPr>
+        </p:nvSpPr>
+        <p:spPr>
+          <a:xfrm>
+            <a:off x="685800" y="4343400"/>
+            <a:ext cx="5486400" cy="4114800"/>
+          </a:xfrm>
+          <a:prstGeom prst="rect">
+            <a:avLst/>
+          </a:prstGeom>
+        </p:spPr>
+        <p:txBody>
+          <a:bodyPr anchorCtr="0" anchor="t" bIns="91425" lIns="91425" spcFirstLastPara="1" rIns="91425" wrap="square" tIns="91425">
+            <a:noAutofit/>
+          </a:bodyPr>
+          <a:lstStyle/>
+          <a:p>
+            <a:pPr indent="0" lvl="0" marL="0" rtl="0" algn="l">
+              <a:spcBef>
+                <a:spcPts val="0"/>
+              </a:spcBef>
+              <a:spcAft>
+                <a:spcPts val="0"/>
+              </a:spcAft>
+              <a:buNone/>
+            </a:pPr>
+            <a:r>
+              <a:t/>
+            </a:r>
+            <a:endParaRPr/>
+          </a:p>
+        </p:txBody>
+      </p:sp>
+    </p:spTree>
+  </p:cSld>
+  <p:clrMapOvr>
+    <a:masterClrMapping/>
+  </p:clrMapOvr>
+</p:notes>
+</file>
+
+<file path=ppt/notesSlides/notesSlide11.xml><?xml version="1.0" encoding="utf-8"?>
+<p:notes xmlns:a="http://schemas.openxmlformats.org/drawingml/2006/main" xmlns:r="http://schemas.openxmlformats.org/officeDocument/2006/relationships" xmlns:mc="http://schemas.openxmlformats.org/markup-compatibility/2006" xmlns:mv="urn:schemas-microsoft-com:mac:vml" xmlns:p="http://schemas.openxmlformats.org/presentationml/2006/main" xmlns:c="http://schemas.openxmlformats.org/drawingml/2006/chart" xmlns:dgm="http://schemas.openxmlformats.org/drawingml/2006/diagram" xmlns:o="urn:schemas-microsoft-com:office:office" xmlns:v="urn:schemas-microsoft-com:vml" xmlns:pvml="urn:schemas-microsoft-com:office:powerpoint" xmlns:com="http://schemas.openxmlformats.org/drawingml/2006/compatibility" xmlns:p14="http://schemas.microsoft.com/office/powerpoint/2010/main" xmlns:p15="http://schemas.microsoft.com/office/powerpoint/2012/main" showMasterPhAnim="0" showMasterSp="0">
+  <p:cSld>
+    <p:spTree>
+      <p:nvGrpSpPr>
+        <p:cNvPr id="117" name="Shape 117"/>
+        <p:cNvGrpSpPr/>
+        <p:nvPr/>
+      </p:nvGrpSpPr>
+      <p:grpSpPr>
+        <a:xfrm>
+          <a:off x="0" y="0"/>
+          <a:ext cx="0" cy="0"/>
+          <a:chOff x="0" y="0"/>
+          <a:chExt cx="0" cy="0"/>
+        </a:xfrm>
+      </p:grpSpPr>
+      <p:sp>
+        <p:nvSpPr>
+          <p:cNvPr id="118" name="Google Shape;118;g6fb0b8e126_0_14:notes"/>
+          <p:cNvSpPr/>
+          <p:nvPr>
+            <p:ph idx="2" type="sldImg"/>
+          </p:nvPr>
+        </p:nvSpPr>
+        <p:spPr>
+          <a:xfrm>
+            <a:off x="381300" y="685800"/>
+            <a:ext cx="6096000" cy="3429000"/>
+          </a:xfrm>
+          <a:custGeom>
+            <a:rect b="b" l="l" r="r" t="t"/>
+            <a:pathLst>
+              <a:path extrusionOk="0" h="120000" w="120000">
+                <a:moveTo>
+                  <a:pt x="0" y="0"/>
+                </a:moveTo>
+                <a:lnTo>
+                  <a:pt x="120000" y="0"/>
+                </a:lnTo>
+                <a:lnTo>
+                  <a:pt x="120000" y="120000"/>
+                </a:lnTo>
+                <a:lnTo>
+                  <a:pt x="0" y="120000"/>
+                </a:lnTo>
+                <a:close/>
+              </a:path>
+            </a:pathLst>
+          </a:custGeom>
+        </p:spPr>
+      </p:sp>
+      <p:sp>
+        <p:nvSpPr>
+          <p:cNvPr id="119" name="Google Shape;119;g6fb0b8e126_0_14:notes"/>
+          <p:cNvSpPr txBox="1"/>
+          <p:nvPr>
+            <p:ph idx="1" type="body"/>
+          </p:nvPr>
+        </p:nvSpPr>
+        <p:spPr>
+          <a:xfrm>
+            <a:off x="685800" y="4343400"/>
+            <a:ext cx="5486400" cy="4114800"/>
+          </a:xfrm>
+          <a:prstGeom prst="rect">
+            <a:avLst/>
+          </a:prstGeom>
+        </p:spPr>
+        <p:txBody>
+          <a:bodyPr anchorCtr="0" anchor="t" bIns="91425" lIns="91425" spcFirstLastPara="1" rIns="91425" wrap="square" tIns="91425">
+            <a:noAutofit/>
+          </a:bodyPr>
+          <a:lstStyle/>
+          <a:p>
+            <a:pPr indent="0" lvl="0" marL="0" rtl="0" algn="l">
+              <a:spcBef>
+                <a:spcPts val="0"/>
+              </a:spcBef>
+              <a:spcAft>
+                <a:spcPts val="0"/>
+              </a:spcAft>
+              <a:buNone/>
+            </a:pPr>
+            <a:r>
+              <a:t/>
+            </a:r>
+            <a:endParaRPr/>
+          </a:p>
+        </p:txBody>
+      </p:sp>
+    </p:spTree>
+  </p:cSld>
+  <p:clrMapOvr>
+    <a:masterClrMapping/>
+  </p:clrMapOvr>
+</p:notes>
+</file>
+
+<file path=ppt/notesSlides/notesSlide12.xml><?xml version="1.0" encoding="utf-8"?>
+<p:notes xmlns:a="http://schemas.openxmlformats.org/drawingml/2006/main" xmlns:r="http://schemas.openxmlformats.org/officeDocument/2006/relationships" xmlns:mc="http://schemas.openxmlformats.org/markup-compatibility/2006" xmlns:mv="urn:schemas-microsoft-com:mac:vml" xmlns:p="http://schemas.openxmlformats.org/presentationml/2006/main" xmlns:c="http://schemas.openxmlformats.org/drawingml/2006/chart" xmlns:dgm="http://schemas.openxmlformats.org/drawingml/2006/diagram" xmlns:o="urn:schemas-microsoft-com:office:office" xmlns:v="urn:schemas-microsoft-com:vml" xmlns:pvml="urn:schemas-microsoft-com:office:powerpoint" xmlns:com="http://schemas.openxmlformats.org/drawingml/2006/compatibility" xmlns:p14="http://schemas.microsoft.com/office/powerpoint/2010/main" xmlns:p15="http://schemas.microsoft.com/office/powerpoint/2012/main" showMasterPhAnim="0" showMasterSp="0">
+  <p:cSld>
+    <p:spTree>
+      <p:nvGrpSpPr>
+        <p:cNvPr id="122" name="Shape 122"/>
+        <p:cNvGrpSpPr/>
+        <p:nvPr/>
+      </p:nvGrpSpPr>
+      <p:grpSpPr>
+        <a:xfrm>
+          <a:off x="0" y="0"/>
+          <a:ext cx="0" cy="0"/>
+          <a:chOff x="0" y="0"/>
+          <a:chExt cx="0" cy="0"/>
+        </a:xfrm>
+      </p:grpSpPr>
+      <p:sp>
+        <p:nvSpPr>
+          <p:cNvPr id="123" name="Google Shape;123;g6fb0b8e126_0_18:notes"/>
+          <p:cNvSpPr/>
+          <p:nvPr>
+            <p:ph idx="2" type="sldImg"/>
+          </p:nvPr>
+        </p:nvSpPr>
+        <p:spPr>
+          <a:xfrm>
+            <a:off x="381300" y="685800"/>
+            <a:ext cx="6096000" cy="3429000"/>
+          </a:xfrm>
+          <a:custGeom>
+            <a:rect b="b" l="l" r="r" t="t"/>
+            <a:pathLst>
+              <a:path extrusionOk="0" h="120000" w="120000">
+                <a:moveTo>
+                  <a:pt x="0" y="0"/>
+                </a:moveTo>
+                <a:lnTo>
+                  <a:pt x="120000" y="0"/>
+                </a:lnTo>
+                <a:lnTo>
+                  <a:pt x="120000" y="120000"/>
+                </a:lnTo>
+                <a:lnTo>
+                  <a:pt x="0" y="120000"/>
+                </a:lnTo>
+                <a:close/>
+              </a:path>
+            </a:pathLst>
+          </a:custGeom>
+        </p:spPr>
+      </p:sp>
+      <p:sp>
+        <p:nvSpPr>
+          <p:cNvPr id="124" name="Google Shape;124;g6fb0b8e126_0_18:notes"/>
+          <p:cNvSpPr txBox="1"/>
+          <p:nvPr>
+            <p:ph idx="1" type="body"/>
+          </p:nvPr>
+        </p:nvSpPr>
+        <p:spPr>
+          <a:xfrm>
+            <a:off x="685800" y="4343400"/>
+            <a:ext cx="5486400" cy="4114800"/>
+          </a:xfrm>
+          <a:prstGeom prst="rect">
+            <a:avLst/>
+          </a:prstGeom>
+        </p:spPr>
+        <p:txBody>
+          <a:bodyPr anchorCtr="0" anchor="t" bIns="91425" lIns="91425" spcFirstLastPara="1" rIns="91425" wrap="square" tIns="91425">
+            <a:noAutofit/>
+          </a:bodyPr>
+          <a:lstStyle/>
+          <a:p>
+            <a:pPr indent="0" lvl="0" marL="0" rtl="0" algn="l">
+              <a:spcBef>
+                <a:spcPts val="0"/>
+              </a:spcBef>
+              <a:spcAft>
+                <a:spcPts val="0"/>
+              </a:spcAft>
+              <a:buNone/>
+            </a:pPr>
+            <a:r>
+              <a:t/>
+            </a:r>
+            <a:endParaRPr/>
+          </a:p>
+        </p:txBody>
+      </p:sp>
+    </p:spTree>
+  </p:cSld>
+  <p:clrMapOvr>
+    <a:masterClrMapping/>
+  </p:clrMapOvr>
+</p:notes>
+</file>
+
+<file path=ppt/notesSlides/notesSlide13.xml><?xml version="1.0" encoding="utf-8"?>
+<p:notes xmlns:a="http://schemas.openxmlformats.org/drawingml/2006/main" xmlns:r="http://schemas.openxmlformats.org/officeDocument/2006/relationships" xmlns:mc="http://schemas.openxmlformats.org/markup-compatibility/2006" xmlns:mv="urn:schemas-microsoft-com:mac:vml" xmlns:p="http://schemas.openxmlformats.org/presentationml/2006/main" xmlns:c="http://schemas.openxmlformats.org/drawingml/2006/chart" xmlns:dgm="http://schemas.openxmlformats.org/drawingml/2006/diagram" xmlns:o="urn:schemas-microsoft-com:office:office" xmlns:v="urn:schemas-microsoft-com:vml" xmlns:pvml="urn:schemas-microsoft-com:office:powerpoint" xmlns:com="http://schemas.openxmlformats.org/drawingml/2006/compatibility" xmlns:p14="http://schemas.microsoft.com/office/powerpoint/2010/main" xmlns:p15="http://schemas.microsoft.com/office/powerpoint/2012/main" showMasterPhAnim="0" showMasterSp="0">
+  <p:cSld>
+    <p:spTree>
+      <p:nvGrpSpPr>
+        <p:cNvPr id="127" name="Shape 127"/>
+        <p:cNvGrpSpPr/>
+        <p:nvPr/>
+      </p:nvGrpSpPr>
+      <p:grpSpPr>
+        <a:xfrm>
+          <a:off x="0" y="0"/>
+          <a:ext cx="0" cy="0"/>
+          <a:chOff x="0" y="0"/>
+          <a:chExt cx="0" cy="0"/>
+        </a:xfrm>
+      </p:grpSpPr>
+      <p:sp>
+        <p:nvSpPr>
+          <p:cNvPr id="128" name="Google Shape;128;g52611f84e4_0_0:notes"/>
+          <p:cNvSpPr/>
+          <p:nvPr>
+            <p:ph idx="2" type="sldImg"/>
+          </p:nvPr>
+        </p:nvSpPr>
+        <p:spPr>
+          <a:xfrm>
+            <a:off x="381300" y="685800"/>
+            <a:ext cx="6096000" cy="3429000"/>
+          </a:xfrm>
+          <a:custGeom>
+            <a:rect b="b" l="l" r="r" t="t"/>
+            <a:pathLst>
+              <a:path extrusionOk="0" h="120000" w="120000">
+                <a:moveTo>
+                  <a:pt x="0" y="0"/>
+                </a:moveTo>
+                <a:lnTo>
+                  <a:pt x="120000" y="0"/>
+                </a:lnTo>
+                <a:lnTo>
+                  <a:pt x="120000" y="120000"/>
+                </a:lnTo>
+                <a:lnTo>
+                  <a:pt x="0" y="120000"/>
+                </a:lnTo>
+                <a:close/>
+              </a:path>
+            </a:pathLst>
+          </a:custGeom>
+        </p:spPr>
+      </p:sp>
+      <p:sp>
+        <p:nvSpPr>
+          <p:cNvPr id="129" name="Google Shape;129;g52611f84e4_0_0:notes"/>
           <p:cNvSpPr txBox="1"/>
           <p:nvPr>
             <p:ph idx="1" type="body"/>
@@ -1025,7 +1327,7 @@
       </p:grpSpPr>
       <p:sp>
         <p:nvSpPr>
-          <p:cNvPr id="68" name="Google Shape;68;g523f01a115_0_55:notes"/>
+          <p:cNvPr id="68" name="Google Shape;68;g6f82034f5a_0_8:notes"/>
           <p:cNvSpPr/>
           <p:nvPr>
             <p:ph idx="2" type="sldImg"/>
@@ -1060,7 +1362,7 @@
       </p:sp>
       <p:sp>
         <p:nvSpPr>
-          <p:cNvPr id="69" name="Google Shape;69;g523f01a115_0_55:notes"/>
+          <p:cNvPr id="69" name="Google Shape;69;g6f82034f5a_0_8:notes"/>
           <p:cNvSpPr txBox="1"/>
           <p:nvPr>
             <p:ph idx="1" type="body"/>
@@ -1110,7 +1412,7 @@
   <p:cSld>
     <p:spTree>
       <p:nvGrpSpPr>
-        <p:cNvPr id="73" name="Shape 73"/>
+        <p:cNvPr id="75" name="Shape 75"/>
         <p:cNvGrpSpPr/>
         <p:nvPr/>
       </p:nvGrpSpPr>
@@ -1124,7 +1426,7 @@
       </p:grpSpPr>
       <p:sp>
         <p:nvSpPr>
-          <p:cNvPr id="74" name="Google Shape;74;g523f01a115_0_60:notes"/>
+          <p:cNvPr id="76" name="Google Shape;76;g523f01a115_0_65:notes"/>
           <p:cNvSpPr/>
           <p:nvPr>
             <p:ph idx="2" type="sldImg"/>
@@ -1159,7 +1461,7 @@
       </p:sp>
       <p:sp>
         <p:nvSpPr>
-          <p:cNvPr id="75" name="Google Shape;75;g523f01a115_0_60:notes"/>
+          <p:cNvPr id="77" name="Google Shape;77;g523f01a115_0_65:notes"/>
           <p:cNvSpPr txBox="1"/>
           <p:nvPr>
             <p:ph idx="1" type="body"/>
@@ -1209,7 +1511,7 @@
   <p:cSld>
     <p:spTree>
       <p:nvGrpSpPr>
-        <p:cNvPr id="79" name="Shape 79"/>
+        <p:cNvPr id="83" name="Shape 83"/>
         <p:cNvGrpSpPr/>
         <p:nvPr/>
       </p:nvGrpSpPr>
@@ -1223,7 +1525,7 @@
       </p:grpSpPr>
       <p:sp>
         <p:nvSpPr>
-          <p:cNvPr id="80" name="Google Shape;80;g523f01a115_0_65:notes"/>
+          <p:cNvPr id="84" name="Google Shape;84;g523f01a115_0_60:notes"/>
           <p:cNvSpPr/>
           <p:nvPr>
             <p:ph idx="2" type="sldImg"/>
@@ -1258,7 +1560,7 @@
       </p:sp>
       <p:sp>
         <p:nvSpPr>
-          <p:cNvPr id="81" name="Google Shape;81;g523f01a115_0_65:notes"/>
+          <p:cNvPr id="85" name="Google Shape;85;g523f01a115_0_60:notes"/>
           <p:cNvSpPr txBox="1"/>
           <p:nvPr>
             <p:ph idx="1" type="body"/>
@@ -1308,7 +1610,7 @@
   <p:cSld>
     <p:spTree>
       <p:nvGrpSpPr>
-        <p:cNvPr id="85" name="Shape 85"/>
+        <p:cNvPr id="90" name="Shape 90"/>
         <p:cNvGrpSpPr/>
         <p:nvPr/>
       </p:nvGrpSpPr>
@@ -1322,7 +1624,7 @@
       </p:grpSpPr>
       <p:sp>
         <p:nvSpPr>
-          <p:cNvPr id="86" name="Google Shape;86;g523f01a115_0_76:notes"/>
+          <p:cNvPr id="91" name="Google Shape;91;g59d5e577e5_0_0:notes"/>
           <p:cNvSpPr/>
           <p:nvPr>
             <p:ph idx="2" type="sldImg"/>
@@ -1357,7 +1659,7 @@
       </p:sp>
       <p:sp>
         <p:nvSpPr>
-          <p:cNvPr id="87" name="Google Shape;87;g523f01a115_0_76:notes"/>
+          <p:cNvPr id="92" name="Google Shape;92;g59d5e577e5_0_0:notes"/>
           <p:cNvSpPr txBox="1"/>
           <p:nvPr>
             <p:ph idx="1" type="body"/>
@@ -1407,7 +1709,7 @@
   <p:cSld>
     <p:spTree>
       <p:nvGrpSpPr>
-        <p:cNvPr id="91" name="Shape 91"/>
+        <p:cNvPr id="96" name="Shape 96"/>
         <p:cNvGrpSpPr/>
         <p:nvPr/>
       </p:nvGrpSpPr>
@@ -1421,7 +1723,7 @@
       </p:grpSpPr>
       <p:sp>
         <p:nvSpPr>
-          <p:cNvPr id="92" name="Google Shape;92;g523f01a115_0_81:notes"/>
+          <p:cNvPr id="97" name="Google Shape;97;g525fd5bde1_0_0:notes"/>
           <p:cNvSpPr/>
           <p:nvPr>
             <p:ph idx="2" type="sldImg"/>
@@ -1456,7 +1758,7 @@
       </p:sp>
       <p:sp>
         <p:nvSpPr>
-          <p:cNvPr id="93" name="Google Shape;93;g523f01a115_0_81:notes"/>
+          <p:cNvPr id="98" name="Google Shape;98;g525fd5bde1_0_0:notes"/>
           <p:cNvSpPr txBox="1"/>
           <p:nvPr>
             <p:ph idx="1" type="body"/>
@@ -1506,7 +1808,7 @@
   <p:cSld>
     <p:spTree>
       <p:nvGrpSpPr>
-        <p:cNvPr id="97" name="Shape 97"/>
+        <p:cNvPr id="102" name="Shape 102"/>
         <p:cNvGrpSpPr/>
         <p:nvPr/>
       </p:nvGrpSpPr>
@@ -1520,7 +1822,7 @@
       </p:grpSpPr>
       <p:sp>
         <p:nvSpPr>
-          <p:cNvPr id="98" name="Google Shape;98;g523f01a115_0_86:notes"/>
+          <p:cNvPr id="103" name="Google Shape;103;g6fb0b8e126_0_0:notes"/>
           <p:cNvSpPr/>
           <p:nvPr>
             <p:ph idx="2" type="sldImg"/>
@@ -1555,7 +1857,7 @@
       </p:sp>
       <p:sp>
         <p:nvSpPr>
-          <p:cNvPr id="99" name="Google Shape;99;g523f01a115_0_86:notes"/>
+          <p:cNvPr id="104" name="Google Shape;104;g6fb0b8e126_0_0:notes"/>
           <p:cNvSpPr txBox="1"/>
           <p:nvPr>
             <p:ph idx="1" type="body"/>
@@ -1605,7 +1907,7 @@
   <p:cSld>
     <p:spTree>
       <p:nvGrpSpPr>
-        <p:cNvPr id="105" name="Shape 105"/>
+        <p:cNvPr id="107" name="Shape 107"/>
         <p:cNvGrpSpPr/>
         <p:nvPr/>
       </p:nvGrpSpPr>
@@ -1619,7 +1921,7 @@
       </p:grpSpPr>
       <p:sp>
         <p:nvSpPr>
-          <p:cNvPr id="106" name="Google Shape;106;g523f01a115_0_93:notes"/>
+          <p:cNvPr id="108" name="Google Shape;108;g6fb0b8e126_0_6:notes"/>
           <p:cNvSpPr/>
           <p:nvPr>
             <p:ph idx="2" type="sldImg"/>
@@ -1654,7 +1956,7 @@
       </p:sp>
       <p:sp>
         <p:nvSpPr>
-          <p:cNvPr id="107" name="Google Shape;107;g523f01a115_0_93:notes"/>
+          <p:cNvPr id="109" name="Google Shape;109;g6fb0b8e126_0_6:notes"/>
           <p:cNvSpPr txBox="1"/>
           <p:nvPr>
             <p:ph idx="1" type="body"/>
@@ -1824,7 +2126,9 @@
           </a:prstGeom>
         </p:spPr>
         <p:txBody>
-          <a:bodyPr anchorCtr="0" anchor="ctr" bIns="91425" lIns="91425" spcFirstLastPara="1" rIns="91425" wrap="square" tIns="91425"/>
+          <a:bodyPr anchorCtr="0" anchor="ctr" bIns="91425" lIns="91425" spcFirstLastPara="1" rIns="91425" wrap="square" tIns="91425">
+            <a:noAutofit/>
+          </a:bodyPr>
           <a:lstStyle>
             <a:lvl1pPr lvl="0" algn="ctr">
               <a:spcBef>
@@ -2055,7 +2359,9 @@
           </a:prstGeom>
         </p:spPr>
         <p:txBody>
-          <a:bodyPr anchorCtr="0" anchor="b" bIns="91425" lIns="91425" spcFirstLastPara="1" rIns="91425" wrap="square" tIns="91425"/>
+          <a:bodyPr anchorCtr="0" anchor="b" bIns="91425" lIns="91425" spcFirstLastPara="1" rIns="91425" wrap="square" tIns="91425">
+            <a:noAutofit/>
+          </a:bodyPr>
           <a:lstStyle>
             <a:lvl1pPr lvl="0" algn="ctr">
               <a:lnSpc>
@@ -2458,7 +2764,9 @@
           </a:prstGeom>
         </p:spPr>
         <p:txBody>
-          <a:bodyPr anchorCtr="0" anchor="b" bIns="91425" lIns="91425" spcFirstLastPara="1" rIns="91425" wrap="square" tIns="91425"/>
+          <a:bodyPr anchorCtr="0" anchor="b" bIns="91425" lIns="91425" spcFirstLastPara="1" rIns="91425" wrap="square" tIns="91425">
+            <a:noAutofit/>
+          </a:bodyPr>
           <a:lstStyle>
             <a:lvl1pPr lvl="0" algn="ctr">
               <a:spcBef>
@@ -2639,7 +2947,9 @@
           </a:prstGeom>
         </p:spPr>
         <p:txBody>
-          <a:bodyPr anchorCtr="0" anchor="t" bIns="91425" lIns="91425" spcFirstLastPara="1" rIns="91425" wrap="square" tIns="91425"/>
+          <a:bodyPr anchorCtr="0" anchor="t" bIns="91425" lIns="91425" spcFirstLastPara="1" rIns="91425" wrap="square" tIns="91425">
+            <a:noAutofit/>
+          </a:bodyPr>
           <a:lstStyle>
             <a:lvl1pPr indent="-342900" lvl="0" marL="457200" algn="ctr">
               <a:spcBef>
@@ -2973,7 +3283,9 @@
           </a:prstGeom>
         </p:spPr>
         <p:txBody>
-          <a:bodyPr anchorCtr="0" anchor="ctr" bIns="91425" lIns="91425" spcFirstLastPara="1" rIns="91425" wrap="square" tIns="91425"/>
+          <a:bodyPr anchorCtr="0" anchor="ctr" bIns="91425" lIns="91425" spcFirstLastPara="1" rIns="91425" wrap="square" tIns="91425">
+            <a:noAutofit/>
+          </a:bodyPr>
           <a:lstStyle>
             <a:lvl1pPr lvl="0" algn="ctr">
               <a:spcBef>
@@ -3385,7 +3697,9 @@
           </a:prstGeom>
         </p:spPr>
         <p:txBody>
-          <a:bodyPr anchorCtr="0" anchor="t" bIns="91425" lIns="91425" spcFirstLastPara="1" rIns="91425" wrap="square" tIns="91425"/>
+          <a:bodyPr anchorCtr="0" anchor="t" bIns="91425" lIns="91425" spcFirstLastPara="1" rIns="91425" wrap="square" tIns="91425">
+            <a:noAutofit/>
+          </a:bodyPr>
           <a:lstStyle>
             <a:lvl1pPr lvl="0">
               <a:spcBef>
@@ -3508,7 +3822,9 @@
           </a:prstGeom>
         </p:spPr>
         <p:txBody>
-          <a:bodyPr anchorCtr="0" anchor="t" bIns="91425" lIns="91425" spcFirstLastPara="1" rIns="91425" wrap="square" tIns="91425"/>
+          <a:bodyPr anchorCtr="0" anchor="t" bIns="91425" lIns="91425" spcFirstLastPara="1" rIns="91425" wrap="square" tIns="91425">
+            <a:noAutofit/>
+          </a:bodyPr>
           <a:lstStyle>
             <a:lvl1pPr indent="-342900" lvl="0" marL="457200">
               <a:spcBef>
@@ -3733,7 +4049,9 @@
           </a:prstGeom>
         </p:spPr>
         <p:txBody>
-          <a:bodyPr anchorCtr="0" anchor="t" bIns="91425" lIns="91425" spcFirstLastPara="1" rIns="91425" wrap="square" tIns="91425"/>
+          <a:bodyPr anchorCtr="0" anchor="t" bIns="91425" lIns="91425" spcFirstLastPara="1" rIns="91425" wrap="square" tIns="91425">
+            <a:noAutofit/>
+          </a:bodyPr>
           <a:lstStyle>
             <a:lvl1pPr lvl="0">
               <a:spcBef>
@@ -3856,7 +4174,9 @@
           </a:prstGeom>
         </p:spPr>
         <p:txBody>
-          <a:bodyPr anchorCtr="0" anchor="t" bIns="91425" lIns="91425" spcFirstLastPara="1" rIns="91425" wrap="square" tIns="91425"/>
+          <a:bodyPr anchorCtr="0" anchor="t" bIns="91425" lIns="91425" spcFirstLastPara="1" rIns="91425" wrap="square" tIns="91425">
+            <a:noAutofit/>
+          </a:bodyPr>
           <a:lstStyle>
             <a:lvl1pPr indent="-317500" lvl="0" marL="457200">
               <a:spcBef>
@@ -3979,7 +4299,9 @@
           </a:prstGeom>
         </p:spPr>
         <p:txBody>
-          <a:bodyPr anchorCtr="0" anchor="t" bIns="91425" lIns="91425" spcFirstLastPara="1" rIns="91425" wrap="square" tIns="91425"/>
+          <a:bodyPr anchorCtr="0" anchor="t" bIns="91425" lIns="91425" spcFirstLastPara="1" rIns="91425" wrap="square" tIns="91425">
+            <a:noAutofit/>
+          </a:bodyPr>
           <a:lstStyle>
             <a:lvl1pPr indent="-317500" lvl="0" marL="457200">
               <a:spcBef>
@@ -4204,7 +4526,9 @@
           </a:prstGeom>
         </p:spPr>
         <p:txBody>
-          <a:bodyPr anchorCtr="0" anchor="t" bIns="91425" lIns="91425" spcFirstLastPara="1" rIns="91425" wrap="square" tIns="91425"/>
+          <a:bodyPr anchorCtr="0" anchor="t" bIns="91425" lIns="91425" spcFirstLastPara="1" rIns="91425" wrap="square" tIns="91425">
+            <a:noAutofit/>
+          </a:bodyPr>
           <a:lstStyle>
             <a:lvl1pPr lvl="0">
               <a:spcBef>
@@ -4429,7 +4753,9 @@
           </a:prstGeom>
         </p:spPr>
         <p:txBody>
-          <a:bodyPr anchorCtr="0" anchor="b" bIns="91425" lIns="91425" spcFirstLastPara="1" rIns="91425" wrap="square" tIns="91425"/>
+          <a:bodyPr anchorCtr="0" anchor="b" bIns="91425" lIns="91425" spcFirstLastPara="1" rIns="91425" wrap="square" tIns="91425">
+            <a:noAutofit/>
+          </a:bodyPr>
           <a:lstStyle>
             <a:lvl1pPr lvl="0">
               <a:spcBef>
@@ -4552,7 +4878,9 @@
           </a:prstGeom>
         </p:spPr>
         <p:txBody>
-          <a:bodyPr anchorCtr="0" anchor="t" bIns="91425" lIns="91425" spcFirstLastPara="1" rIns="91425" wrap="square" tIns="91425"/>
+          <a:bodyPr anchorCtr="0" anchor="t" bIns="91425" lIns="91425" spcFirstLastPara="1" rIns="91425" wrap="square" tIns="91425">
+            <a:noAutofit/>
+          </a:bodyPr>
           <a:lstStyle>
             <a:lvl1pPr indent="-304800" lvl="0" marL="457200">
               <a:spcBef>
@@ -4784,7 +5112,9 @@
           </a:prstGeom>
         </p:spPr>
         <p:txBody>
-          <a:bodyPr anchorCtr="0" anchor="ctr" bIns="91425" lIns="91425" spcFirstLastPara="1" rIns="91425" wrap="square" tIns="91425"/>
+          <a:bodyPr anchorCtr="0" anchor="ctr" bIns="91425" lIns="91425" spcFirstLastPara="1" rIns="91425" wrap="square" tIns="91425">
+            <a:noAutofit/>
+          </a:bodyPr>
           <a:lstStyle>
             <a:lvl1pPr lvl="0">
               <a:spcBef>
@@ -5222,7 +5552,9 @@
           </a:prstGeom>
         </p:spPr>
         <p:txBody>
-          <a:bodyPr anchorCtr="0" anchor="b" bIns="91425" lIns="91425" spcFirstLastPara="1" rIns="91425" wrap="square" tIns="91425"/>
+          <a:bodyPr anchorCtr="0" anchor="b" bIns="91425" lIns="91425" spcFirstLastPara="1" rIns="91425" wrap="square" tIns="91425">
+            <a:noAutofit/>
+          </a:bodyPr>
           <a:lstStyle>
             <a:lvl1pPr lvl="0" algn="ctr">
               <a:spcBef>
@@ -5345,7 +5677,9 @@
           </a:prstGeom>
         </p:spPr>
         <p:txBody>
-          <a:bodyPr anchorCtr="0" anchor="t" bIns="91425" lIns="91425" spcFirstLastPara="1" rIns="91425" wrap="square" tIns="91425"/>
+          <a:bodyPr anchorCtr="0" anchor="t" bIns="91425" lIns="91425" spcFirstLastPara="1" rIns="91425" wrap="square" tIns="91425">
+            <a:noAutofit/>
+          </a:bodyPr>
           <a:lstStyle>
             <a:lvl1pPr lvl="0" algn="ctr">
               <a:lnSpc>
@@ -5495,7 +5829,9 @@
           </a:prstGeom>
         </p:spPr>
         <p:txBody>
-          <a:bodyPr anchorCtr="0" anchor="ctr" bIns="91425" lIns="91425" spcFirstLastPara="1" rIns="91425" wrap="square" tIns="91425"/>
+          <a:bodyPr anchorCtr="0" anchor="ctr" bIns="91425" lIns="91425" spcFirstLastPara="1" rIns="91425" wrap="square" tIns="91425">
+            <a:noAutofit/>
+          </a:bodyPr>
           <a:lstStyle>
             <a:lvl1pPr indent="-342900" lvl="0" marL="457200">
               <a:spcBef>
@@ -5819,7 +6155,9 @@
           </a:prstGeom>
         </p:spPr>
         <p:txBody>
-          <a:bodyPr anchorCtr="0" anchor="ctr" bIns="91425" lIns="91425" spcFirstLastPara="1" rIns="91425" wrap="square" tIns="91425"/>
+          <a:bodyPr anchorCtr="0" anchor="ctr" bIns="91425" lIns="91425" spcFirstLastPara="1" rIns="91425" wrap="square" tIns="91425">
+            <a:noAutofit/>
+          </a:bodyPr>
           <a:lstStyle>
             <a:lvl1pPr indent="-228600" lvl="0" marL="457200">
               <a:lnSpc>
@@ -5970,7 +6308,9 @@
           </a:ln>
         </p:spPr>
         <p:txBody>
-          <a:bodyPr anchorCtr="0" anchor="t" bIns="91425" lIns="91425" spcFirstLastPara="1" rIns="91425" wrap="square" tIns="91425"/>
+          <a:bodyPr anchorCtr="0" anchor="t" bIns="91425" lIns="91425" spcFirstLastPara="1" rIns="91425" wrap="square" tIns="91425">
+            <a:noAutofit/>
+          </a:bodyPr>
           <a:lstStyle>
             <a:lvl1pPr lvl="0">
               <a:spcBef>
@@ -6205,7 +6545,9 @@
           </a:ln>
         </p:spPr>
         <p:txBody>
-          <a:bodyPr anchorCtr="0" anchor="t" bIns="91425" lIns="91425" spcFirstLastPara="1" rIns="91425" wrap="square" tIns="91425"/>
+          <a:bodyPr anchorCtr="0" anchor="t" bIns="91425" lIns="91425" spcFirstLastPara="1" rIns="91425" wrap="square" tIns="91425">
+            <a:noAutofit/>
+          </a:bodyPr>
           <a:lstStyle>
             <a:lvl1pPr indent="-342900" lvl="0" marL="457200">
               <a:lnSpc>
@@ -7417,7 +7759,166 @@
   <p:cSld>
     <p:spTree>
       <p:nvGrpSpPr>
-        <p:cNvPr id="114" name="Shape 114"/>
+        <p:cNvPr id="115" name="Shape 115"/>
+        <p:cNvGrpSpPr/>
+        <p:nvPr/>
+      </p:nvGrpSpPr>
+      <p:grpSpPr>
+        <a:xfrm>
+          <a:off x="0" y="0"/>
+          <a:ext cx="0" cy="0"/>
+          <a:chOff x="0" y="0"/>
+          <a:chExt cx="0" cy="0"/>
+        </a:xfrm>
+      </p:grpSpPr>
+      <p:pic>
+        <p:nvPicPr>
+          <p:cNvPr id="116" name="Google Shape;116;p22"/>
+          <p:cNvPicPr preferRelativeResize="0"/>
+          <p:nvPr/>
+        </p:nvPicPr>
+        <p:blipFill>
+          <a:blip r:embed="rId3">
+            <a:alphaModFix/>
+          </a:blip>
+          <a:stretch>
+            <a:fillRect/>
+          </a:stretch>
+        </p:blipFill>
+        <p:spPr>
+          <a:xfrm>
+            <a:off x="152400" y="152400"/>
+            <a:ext cx="8839200" cy="4299903"/>
+          </a:xfrm>
+          <a:prstGeom prst="rect">
+            <a:avLst/>
+          </a:prstGeom>
+          <a:noFill/>
+          <a:ln>
+            <a:noFill/>
+          </a:ln>
+        </p:spPr>
+      </p:pic>
+    </p:spTree>
+  </p:cSld>
+  <p:clrMapOvr>
+    <a:masterClrMapping/>
+  </p:clrMapOvr>
+</p:sld>
+</file>
+
+<file path=ppt/slides/slide11.xml><?xml version="1.0" encoding="utf-8"?>
+<p:sld xmlns:a="http://schemas.openxmlformats.org/drawingml/2006/main" xmlns:r="http://schemas.openxmlformats.org/officeDocument/2006/relationships" xmlns:mc="http://schemas.openxmlformats.org/markup-compatibility/2006" xmlns:mv="urn:schemas-microsoft-com:mac:vml" xmlns:p="http://schemas.openxmlformats.org/presentationml/2006/main" xmlns:c="http://schemas.openxmlformats.org/drawingml/2006/chart" xmlns:dgm="http://schemas.openxmlformats.org/drawingml/2006/diagram" xmlns:o="urn:schemas-microsoft-com:office:office" xmlns:v="urn:schemas-microsoft-com:vml" xmlns:pvml="urn:schemas-microsoft-com:office:powerpoint" xmlns:com="http://schemas.openxmlformats.org/drawingml/2006/compatibility" xmlns:p14="http://schemas.microsoft.com/office/powerpoint/2010/main" xmlns:p15="http://schemas.microsoft.com/office/powerpoint/2012/main">
+  <p:cSld>
+    <p:spTree>
+      <p:nvGrpSpPr>
+        <p:cNvPr id="120" name="Shape 120"/>
+        <p:cNvGrpSpPr/>
+        <p:nvPr/>
+      </p:nvGrpSpPr>
+      <p:grpSpPr>
+        <a:xfrm>
+          <a:off x="0" y="0"/>
+          <a:ext cx="0" cy="0"/>
+          <a:chOff x="0" y="0"/>
+          <a:chExt cx="0" cy="0"/>
+        </a:xfrm>
+      </p:grpSpPr>
+      <p:pic>
+        <p:nvPicPr>
+          <p:cNvPr id="121" name="Google Shape;121;p23"/>
+          <p:cNvPicPr preferRelativeResize="0"/>
+          <p:nvPr/>
+        </p:nvPicPr>
+        <p:blipFill>
+          <a:blip r:embed="rId3">
+            <a:alphaModFix/>
+          </a:blip>
+          <a:stretch>
+            <a:fillRect/>
+          </a:stretch>
+        </p:blipFill>
+        <p:spPr>
+          <a:xfrm>
+            <a:off x="152400" y="152400"/>
+            <a:ext cx="8839200" cy="4299903"/>
+          </a:xfrm>
+          <a:prstGeom prst="rect">
+            <a:avLst/>
+          </a:prstGeom>
+          <a:noFill/>
+          <a:ln>
+            <a:noFill/>
+          </a:ln>
+        </p:spPr>
+      </p:pic>
+    </p:spTree>
+  </p:cSld>
+  <p:clrMapOvr>
+    <a:masterClrMapping/>
+  </p:clrMapOvr>
+</p:sld>
+</file>
+
+<file path=ppt/slides/slide12.xml><?xml version="1.0" encoding="utf-8"?>
+<p:sld xmlns:a="http://schemas.openxmlformats.org/drawingml/2006/main" xmlns:r="http://schemas.openxmlformats.org/officeDocument/2006/relationships" xmlns:mc="http://schemas.openxmlformats.org/markup-compatibility/2006" xmlns:mv="urn:schemas-microsoft-com:mac:vml" xmlns:p="http://schemas.openxmlformats.org/presentationml/2006/main" xmlns:c="http://schemas.openxmlformats.org/drawingml/2006/chart" xmlns:dgm="http://schemas.openxmlformats.org/drawingml/2006/diagram" xmlns:o="urn:schemas-microsoft-com:office:office" xmlns:v="urn:schemas-microsoft-com:vml" xmlns:pvml="urn:schemas-microsoft-com:office:powerpoint" xmlns:com="http://schemas.openxmlformats.org/drawingml/2006/compatibility" xmlns:p14="http://schemas.microsoft.com/office/powerpoint/2010/main" xmlns:p15="http://schemas.microsoft.com/office/powerpoint/2012/main">
+  <p:cSld>
+    <p:spTree>
+      <p:nvGrpSpPr>
+        <p:cNvPr id="125" name="Shape 125"/>
+        <p:cNvGrpSpPr/>
+        <p:nvPr/>
+      </p:nvGrpSpPr>
+      <p:grpSpPr>
+        <a:xfrm>
+          <a:off x="0" y="0"/>
+          <a:ext cx="0" cy="0"/>
+          <a:chOff x="0" y="0"/>
+          <a:chExt cx="0" cy="0"/>
+        </a:xfrm>
+      </p:grpSpPr>
+      <p:pic>
+        <p:nvPicPr>
+          <p:cNvPr id="126" name="Google Shape;126;p24"/>
+          <p:cNvPicPr preferRelativeResize="0"/>
+          <p:nvPr/>
+        </p:nvPicPr>
+        <p:blipFill>
+          <a:blip r:embed="rId3">
+            <a:alphaModFix/>
+          </a:blip>
+          <a:stretch>
+            <a:fillRect/>
+          </a:stretch>
+        </p:blipFill>
+        <p:spPr>
+          <a:xfrm>
+            <a:off x="152400" y="152400"/>
+            <a:ext cx="8839202" cy="4315963"/>
+          </a:xfrm>
+          <a:prstGeom prst="rect">
+            <a:avLst/>
+          </a:prstGeom>
+          <a:noFill/>
+          <a:ln>
+            <a:noFill/>
+          </a:ln>
+        </p:spPr>
+      </p:pic>
+    </p:spTree>
+  </p:cSld>
+  <p:clrMapOvr>
+    <a:masterClrMapping/>
+  </p:clrMapOvr>
+</p:sld>
+</file>
+
+<file path=ppt/slides/slide13.xml><?xml version="1.0" encoding="utf-8"?>
+<p:sld xmlns:a="http://schemas.openxmlformats.org/drawingml/2006/main" xmlns:r="http://schemas.openxmlformats.org/officeDocument/2006/relationships" xmlns:mc="http://schemas.openxmlformats.org/markup-compatibility/2006" xmlns:mv="urn:schemas-microsoft-com:mac:vml" xmlns:p="http://schemas.openxmlformats.org/presentationml/2006/main" xmlns:c="http://schemas.openxmlformats.org/drawingml/2006/chart" xmlns:dgm="http://schemas.openxmlformats.org/drawingml/2006/diagram" xmlns:o="urn:schemas-microsoft-com:office:office" xmlns:v="urn:schemas-microsoft-com:vml" xmlns:pvml="urn:schemas-microsoft-com:office:powerpoint" xmlns:com="http://schemas.openxmlformats.org/drawingml/2006/compatibility" xmlns:p14="http://schemas.microsoft.com/office/powerpoint/2010/main" xmlns:p15="http://schemas.microsoft.com/office/powerpoint/2012/main">
+  <p:cSld>
+    <p:spTree>
+      <p:nvGrpSpPr>
+        <p:cNvPr id="130" name="Shape 130"/>
         <p:cNvGrpSpPr/>
         <p:nvPr/>
       </p:nvGrpSpPr>
@@ -7431,7 +7932,7 @@
       </p:grpSpPr>
       <p:sp>
         <p:nvSpPr>
-          <p:cNvPr id="115" name="Google Shape;115;p22"/>
+          <p:cNvPr id="131" name="Google Shape;131;p25"/>
           <p:cNvSpPr txBox="1"/>
           <p:nvPr>
             <p:ph type="title"/>
@@ -7471,7 +7972,7 @@
       </p:sp>
       <p:sp>
         <p:nvSpPr>
-          <p:cNvPr id="116" name="Google Shape;116;p22"/>
+          <p:cNvPr id="132" name="Google Shape;132;p25"/>
           <p:cNvSpPr txBox="1"/>
           <p:nvPr>
             <p:ph idx="1" type="body"/>
@@ -7604,7 +8105,7 @@
                 <a:spcPts val="0"/>
               </a:spcBef>
               <a:spcAft>
-                <a:spcPts val="0"/>
+                <a:spcPts val="1000"/>
               </a:spcAft>
               <a:buClr>
                 <a:srgbClr val="373A3C"/>
@@ -7618,100 +8119,7 @@
                   <a:srgbClr val="373A3C"/>
                 </a:solidFill>
               </a:rPr>
-              <a:t>Project will be a central hub for Soldiers to submit unclassified training files (Powerpoints, Papers, video (links), audio, Etc...)</a:t>
-            </a:r>
-            <a:endParaRPr>
-              <a:solidFill>
-                <a:srgbClr val="373A3C"/>
-              </a:solidFill>
-            </a:endParaRPr>
-          </a:p>
-          <a:p>
-            <a:pPr indent="-342900" lvl="0" marL="457200" rtl="0" algn="l">
-              <a:lnSpc>
-                <a:spcPct val="115000"/>
-              </a:lnSpc>
-              <a:spcBef>
-                <a:spcPts val="1000"/>
-              </a:spcBef>
-              <a:spcAft>
-                <a:spcPts val="0"/>
-              </a:spcAft>
-              <a:buClr>
-                <a:srgbClr val="373A3C"/>
-              </a:buClr>
-              <a:buSzPts val="1800"/>
-              <a:buChar char="❏"/>
-            </a:pPr>
-            <a:r>
-              <a:rPr lang="en">
-                <a:solidFill>
-                  <a:srgbClr val="373A3C"/>
-                </a:solidFill>
-              </a:rPr>
-              <a:t> Soldiers in  other units/duty  stations can log into the system and search/browse the training by title, keywords, or MOS/topic. </a:t>
-            </a:r>
-            <a:endParaRPr>
-              <a:solidFill>
-                <a:srgbClr val="373A3C"/>
-              </a:solidFill>
-            </a:endParaRPr>
-          </a:p>
-          <a:p>
-            <a:pPr indent="-342900" lvl="0" marL="457200" rtl="0" algn="l">
-              <a:lnSpc>
-                <a:spcPct val="115000"/>
-              </a:lnSpc>
-              <a:spcBef>
-                <a:spcPts val="1000"/>
-              </a:spcBef>
-              <a:spcAft>
-                <a:spcPts val="0"/>
-              </a:spcAft>
-              <a:buClr>
-                <a:srgbClr val="373A3C"/>
-              </a:buClr>
-              <a:buSzPts val="1800"/>
-              <a:buChar char="❏"/>
-            </a:pPr>
-            <a:r>
-              <a:rPr lang="en">
-                <a:solidFill>
-                  <a:srgbClr val="373A3C"/>
-                </a:solidFill>
-              </a:rPr>
-              <a:t> Users can rate/download/comment on the training and submit their own versions of the training. </a:t>
-            </a:r>
-            <a:endParaRPr>
-              <a:solidFill>
-                <a:srgbClr val="373A3C"/>
-              </a:solidFill>
-            </a:endParaRPr>
-          </a:p>
-          <a:p>
-            <a:pPr indent="-342900" lvl="0" marL="457200" rtl="0" algn="l">
-              <a:lnSpc>
-                <a:spcPct val="115000"/>
-              </a:lnSpc>
-              <a:spcBef>
-                <a:spcPts val="1000"/>
-              </a:spcBef>
-              <a:spcAft>
-                <a:spcPts val="1000"/>
-              </a:spcAft>
-              <a:buClr>
-                <a:srgbClr val="373A3C"/>
-              </a:buClr>
-              <a:buSzPts val="1800"/>
-              <a:buChar char="❏"/>
-            </a:pPr>
-            <a:r>
-              <a:rPr lang="en">
-                <a:solidFill>
-                  <a:srgbClr val="373A3C"/>
-                </a:solidFill>
-              </a:rPr>
-              <a:t>Users will create profiles in order to vote/download/track progress.</a:t>
+              <a:t>Project is a web app for a commercial truck dealer in Fort Myers Florida</a:t>
             </a:r>
             <a:endParaRPr/>
           </a:p>
@@ -7792,8 +8200,260 @@
         </p:nvSpPr>
         <p:spPr>
           <a:xfrm>
-            <a:off x="311700" y="1152475"/>
-            <a:ext cx="8520600" cy="3416400"/>
+            <a:off x="311700" y="1685875"/>
+            <a:ext cx="3999900" cy="3416400"/>
+          </a:xfrm>
+          <a:prstGeom prst="rect">
+            <a:avLst/>
+          </a:prstGeom>
+        </p:spPr>
+        <p:txBody>
+          <a:bodyPr anchorCtr="0" anchor="t" bIns="91425" lIns="91425" spcFirstLastPara="1" rIns="91425" wrap="square" tIns="91425">
+            <a:noAutofit/>
+          </a:bodyPr>
+          <a:lstStyle/>
+          <a:p>
+            <a:pPr indent="0" lvl="0" marL="457200" rtl="0" algn="l">
+              <a:spcBef>
+                <a:spcPts val="0"/>
+              </a:spcBef>
+              <a:spcAft>
+                <a:spcPts val="0"/>
+              </a:spcAft>
+              <a:buNone/>
+            </a:pPr>
+            <a:r>
+              <a:rPr b="1" lang="en" sz="1800"/>
+              <a:t>Clients Requirements:</a:t>
+            </a:r>
+            <a:endParaRPr b="1" sz="1800"/>
+          </a:p>
+          <a:p>
+            <a:pPr indent="-342900" lvl="0" marL="457200" rtl="0" algn="l">
+              <a:spcBef>
+                <a:spcPts val="1600"/>
+              </a:spcBef>
+              <a:spcAft>
+                <a:spcPts val="0"/>
+              </a:spcAft>
+              <a:buSzPts val="1800"/>
+              <a:buChar char="●"/>
+            </a:pPr>
+            <a:r>
+              <a:rPr lang="en" sz="1800"/>
+              <a:t>Easy to use / Hard to mess up</a:t>
+            </a:r>
+            <a:endParaRPr sz="1800"/>
+          </a:p>
+          <a:p>
+            <a:pPr indent="-342900" lvl="0" marL="457200" rtl="0" algn="l">
+              <a:spcBef>
+                <a:spcPts val="0"/>
+              </a:spcBef>
+              <a:spcAft>
+                <a:spcPts val="0"/>
+              </a:spcAft>
+              <a:buSzPts val="1800"/>
+              <a:buChar char="●"/>
+            </a:pPr>
+            <a:r>
+              <a:rPr lang="en" sz="1800"/>
+              <a:t>Cheap to maintain</a:t>
+            </a:r>
+            <a:endParaRPr sz="1800"/>
+          </a:p>
+          <a:p>
+            <a:pPr indent="-342900" lvl="0" marL="457200" rtl="0" algn="l">
+              <a:spcBef>
+                <a:spcPts val="0"/>
+              </a:spcBef>
+              <a:spcAft>
+                <a:spcPts val="0"/>
+              </a:spcAft>
+              <a:buSzPts val="1800"/>
+              <a:buChar char="●"/>
+            </a:pPr>
+            <a:r>
+              <a:rPr lang="en" sz="1800"/>
+              <a:t>Makes the dealership look professional</a:t>
+            </a:r>
+            <a:endParaRPr sz="1800"/>
+          </a:p>
+        </p:txBody>
+      </p:sp>
+      <p:sp>
+        <p:nvSpPr>
+          <p:cNvPr id="73" name="Google Shape;73;p15"/>
+          <p:cNvSpPr txBox="1"/>
+          <p:nvPr>
+            <p:ph idx="2" type="body"/>
+          </p:nvPr>
+        </p:nvSpPr>
+        <p:spPr>
+          <a:xfrm>
+            <a:off x="4832400" y="1685875"/>
+            <a:ext cx="3999900" cy="3416400"/>
+          </a:xfrm>
+          <a:prstGeom prst="rect">
+            <a:avLst/>
+          </a:prstGeom>
+        </p:spPr>
+        <p:txBody>
+          <a:bodyPr anchorCtr="0" anchor="t" bIns="91425" lIns="91425" spcFirstLastPara="1" rIns="91425" wrap="square" tIns="91425">
+            <a:noAutofit/>
+          </a:bodyPr>
+          <a:lstStyle/>
+          <a:p>
+            <a:pPr indent="0" lvl="0" marL="457200" rtl="0" algn="l">
+              <a:spcBef>
+                <a:spcPts val="0"/>
+              </a:spcBef>
+              <a:spcAft>
+                <a:spcPts val="0"/>
+              </a:spcAft>
+              <a:buNone/>
+            </a:pPr>
+            <a:r>
+              <a:rPr b="1" lang="en" sz="1800"/>
+              <a:t>Solution</a:t>
+            </a:r>
+            <a:r>
+              <a:rPr b="1" lang="en" sz="1600"/>
+              <a:t>:</a:t>
+            </a:r>
+            <a:endParaRPr b="1" sz="1600"/>
+          </a:p>
+          <a:p>
+            <a:pPr indent="-330200" lvl="0" marL="457200" rtl="0" algn="l">
+              <a:spcBef>
+                <a:spcPts val="1600"/>
+              </a:spcBef>
+              <a:spcAft>
+                <a:spcPts val="0"/>
+              </a:spcAft>
+              <a:buSzPts val="1600"/>
+              <a:buChar char="●"/>
+            </a:pPr>
+            <a:r>
+              <a:rPr lang="en" sz="1600"/>
+              <a:t>Website</a:t>
+            </a:r>
+            <a:endParaRPr sz="1600"/>
+          </a:p>
+          <a:p>
+            <a:pPr indent="-330200" lvl="1" marL="914400" rtl="0" algn="l">
+              <a:spcBef>
+                <a:spcPts val="0"/>
+              </a:spcBef>
+              <a:spcAft>
+                <a:spcPts val="0"/>
+              </a:spcAft>
+              <a:buSzPts val="1600"/>
+              <a:buChar char="○"/>
+            </a:pPr>
+            <a:r>
+              <a:rPr lang="en" sz="1600"/>
+              <a:t>Display’s inventory</a:t>
+            </a:r>
+            <a:endParaRPr sz="1600"/>
+          </a:p>
+          <a:p>
+            <a:pPr indent="-330200" lvl="1" marL="914400" rtl="0" algn="l">
+              <a:spcBef>
+                <a:spcPts val="0"/>
+              </a:spcBef>
+              <a:spcAft>
+                <a:spcPts val="0"/>
+              </a:spcAft>
+              <a:buSzPts val="1600"/>
+              <a:buChar char="○"/>
+            </a:pPr>
+            <a:r>
+              <a:rPr lang="en" sz="1600"/>
+              <a:t>Allows client to maintain inventory</a:t>
+            </a:r>
+            <a:endParaRPr sz="1600"/>
+          </a:p>
+          <a:p>
+            <a:pPr indent="-330200" lvl="1" marL="914400" rtl="0" algn="l">
+              <a:spcBef>
+                <a:spcPts val="0"/>
+              </a:spcBef>
+              <a:spcAft>
+                <a:spcPts val="0"/>
+              </a:spcAft>
+              <a:buSzPts val="1600"/>
+              <a:buChar char="○"/>
+            </a:pPr>
+            <a:r>
+              <a:rPr lang="en" sz="1600"/>
+              <a:t>Allows client to upload and display information on inventory</a:t>
+            </a:r>
+            <a:endParaRPr sz="1600"/>
+          </a:p>
+          <a:p>
+            <a:pPr indent="-330200" lvl="2" marL="1371600" rtl="0" algn="l">
+              <a:spcBef>
+                <a:spcPts val="0"/>
+              </a:spcBef>
+              <a:spcAft>
+                <a:spcPts val="0"/>
+              </a:spcAft>
+              <a:buSzPts val="1600"/>
+              <a:buChar char="■"/>
+            </a:pPr>
+            <a:r>
+              <a:rPr lang="en" sz="1600"/>
+              <a:t>store and display photos</a:t>
+            </a:r>
+            <a:endParaRPr sz="1600"/>
+          </a:p>
+          <a:p>
+            <a:pPr indent="-330200" lvl="1" marL="914400" rtl="0" algn="l">
+              <a:spcBef>
+                <a:spcPts val="0"/>
+              </a:spcBef>
+              <a:spcAft>
+                <a:spcPts val="0"/>
+              </a:spcAft>
+              <a:buSzPts val="1600"/>
+              <a:buChar char="○"/>
+            </a:pPr>
+            <a:r>
+              <a:rPr lang="en" sz="1600"/>
+              <a:t>Able to contact the dealership from website</a:t>
+            </a:r>
+            <a:endParaRPr sz="1600"/>
+          </a:p>
+          <a:p>
+            <a:pPr indent="0" lvl="0" marL="457200" rtl="0" algn="l">
+              <a:spcBef>
+                <a:spcPts val="1600"/>
+              </a:spcBef>
+              <a:spcAft>
+                <a:spcPts val="1600"/>
+              </a:spcAft>
+              <a:buNone/>
+            </a:pPr>
+            <a:r>
+              <a:t/>
+            </a:r>
+            <a:endParaRPr/>
+          </a:p>
+        </p:txBody>
+      </p:sp>
+      <p:sp>
+        <p:nvSpPr>
+          <p:cNvPr id="74" name="Google Shape;74;p15"/>
+          <p:cNvSpPr txBox="1"/>
+          <p:nvPr>
+            <p:ph type="title"/>
+          </p:nvPr>
+        </p:nvSpPr>
+        <p:spPr>
+          <a:xfrm>
+            <a:off x="1109525" y="950850"/>
+            <a:ext cx="8520600" cy="626100"/>
           </a:xfrm>
           <a:prstGeom prst="rect">
             <a:avLst/>
@@ -7815,65 +8475,10 @@
               <a:buNone/>
             </a:pPr>
             <a:r>
-              <a:rPr lang="en"/>
-              <a:t>SFC Jason O. Eck</a:t>
+              <a:rPr lang="en" sz="2400"/>
+              <a:t>Todd Allan Motors</a:t>
             </a:r>
-            <a:endParaRPr/>
-          </a:p>
-          <a:p>
-            <a:pPr indent="0" lvl="0" marL="0" rtl="0" algn="l">
-              <a:spcBef>
-                <a:spcPts val="1600"/>
-              </a:spcBef>
-              <a:spcAft>
-                <a:spcPts val="0"/>
-              </a:spcAft>
-              <a:buNone/>
-            </a:pPr>
-            <a:r>
-              <a:rPr lang="en"/>
-              <a:t>	111th Military Intelligence Brigade, Fort </a:t>
-            </a:r>
-            <a:r>
-              <a:rPr lang="en"/>
-              <a:t>Huachuca</a:t>
-            </a:r>
-            <a:r>
-              <a:rPr lang="en"/>
-              <a:t> AZ</a:t>
-            </a:r>
-            <a:endParaRPr/>
-          </a:p>
-          <a:p>
-            <a:pPr indent="0" lvl="0" marL="0" rtl="0" algn="l">
-              <a:spcBef>
-                <a:spcPts val="1600"/>
-              </a:spcBef>
-              <a:spcAft>
-                <a:spcPts val="0"/>
-              </a:spcAft>
-              <a:buNone/>
-            </a:pPr>
-            <a:r>
-              <a:t/>
-            </a:r>
-            <a:endParaRPr/>
-          </a:p>
-          <a:p>
-            <a:pPr indent="0" lvl="0" marL="0" rtl="0" algn="l">
-              <a:spcBef>
-                <a:spcPts val="1600"/>
-              </a:spcBef>
-              <a:spcAft>
-                <a:spcPts val="1600"/>
-              </a:spcAft>
-              <a:buNone/>
-            </a:pPr>
-            <a:r>
-              <a:rPr lang="en"/>
-              <a:t>The client is in charge of Field Training Exercises (FTX) for incoming intelligence Soldiers. The client has almost 20 years of experience in the military and is in tune with the wants and needs of today’s warfighters. </a:t>
-            </a:r>
-            <a:endParaRPr/>
+            <a:endParaRPr sz="2400"/>
           </a:p>
         </p:txBody>
       </p:sp>
@@ -7890,7 +8495,7 @@
   <p:cSld>
     <p:spTree>
       <p:nvGrpSpPr>
-        <p:cNvPr id="76" name="Shape 76"/>
+        <p:cNvPr id="78" name="Shape 78"/>
         <p:cNvGrpSpPr/>
         <p:nvPr/>
       </p:nvGrpSpPr>
@@ -7904,7 +8509,182 @@
       </p:grpSpPr>
       <p:sp>
         <p:nvSpPr>
-          <p:cNvPr id="77" name="Google Shape;77;p16"/>
+          <p:cNvPr id="79" name="Google Shape;79;p16"/>
+          <p:cNvSpPr txBox="1"/>
+          <p:nvPr>
+            <p:ph type="title"/>
+          </p:nvPr>
+        </p:nvSpPr>
+        <p:spPr>
+          <a:xfrm>
+            <a:off x="5153425" y="391350"/>
+            <a:ext cx="3678900" cy="626100"/>
+          </a:xfrm>
+          <a:prstGeom prst="rect">
+            <a:avLst/>
+          </a:prstGeom>
+        </p:spPr>
+        <p:txBody>
+          <a:bodyPr anchorCtr="0" anchor="t" bIns="91425" lIns="91425" spcFirstLastPara="1" rIns="91425" wrap="square" tIns="91425">
+            <a:noAutofit/>
+          </a:bodyPr>
+          <a:lstStyle/>
+          <a:p>
+            <a:pPr indent="0" lvl="0" marL="0" rtl="0" algn="l">
+              <a:spcBef>
+                <a:spcPts val="0"/>
+              </a:spcBef>
+              <a:spcAft>
+                <a:spcPts val="0"/>
+              </a:spcAft>
+              <a:buNone/>
+            </a:pPr>
+            <a:r>
+              <a:rPr lang="en"/>
+              <a:t>Main Objectives</a:t>
+            </a:r>
+            <a:endParaRPr/>
+          </a:p>
+        </p:txBody>
+      </p:sp>
+      <p:pic>
+        <p:nvPicPr>
+          <p:cNvPr id="80" name="Google Shape;80;p16"/>
+          <p:cNvPicPr preferRelativeResize="0"/>
+          <p:nvPr/>
+        </p:nvPicPr>
+        <p:blipFill>
+          <a:blip r:embed="rId3">
+            <a:alphaModFix/>
+          </a:blip>
+          <a:stretch>
+            <a:fillRect/>
+          </a:stretch>
+        </p:blipFill>
+        <p:spPr>
+          <a:xfrm>
+            <a:off x="262649" y="391350"/>
+            <a:ext cx="4056698" cy="2764224"/>
+          </a:xfrm>
+          <a:prstGeom prst="rect">
+            <a:avLst/>
+          </a:prstGeom>
+          <a:noFill/>
+          <a:ln>
+            <a:noFill/>
+          </a:ln>
+        </p:spPr>
+      </p:pic>
+      <p:pic>
+        <p:nvPicPr>
+          <p:cNvPr id="81" name="Google Shape;81;p16"/>
+          <p:cNvPicPr preferRelativeResize="0"/>
+          <p:nvPr/>
+        </p:nvPicPr>
+        <p:blipFill>
+          <a:blip r:embed="rId4">
+            <a:alphaModFix/>
+          </a:blip>
+          <a:stretch>
+            <a:fillRect/>
+          </a:stretch>
+        </p:blipFill>
+        <p:spPr>
+          <a:xfrm>
+            <a:off x="4319350" y="2519728"/>
+            <a:ext cx="4731827" cy="2364671"/>
+          </a:xfrm>
+          <a:prstGeom prst="rect">
+            <a:avLst/>
+          </a:prstGeom>
+          <a:noFill/>
+          <a:ln>
+            <a:noFill/>
+          </a:ln>
+        </p:spPr>
+      </p:pic>
+      <p:sp>
+        <p:nvSpPr>
+          <p:cNvPr id="82" name="Google Shape;82;p16"/>
+          <p:cNvSpPr/>
+          <p:nvPr/>
+        </p:nvSpPr>
+        <p:spPr>
+          <a:xfrm rot="2229669">
+            <a:off x="4396826" y="1335862"/>
+            <a:ext cx="1664242" cy="816070"/>
+          </a:xfrm>
+          <a:prstGeom prst="bentArrow">
+            <a:avLst>
+              <a:gd fmla="val 25000" name="adj1"/>
+              <a:gd fmla="val 25000" name="adj2"/>
+              <a:gd fmla="val 25000" name="adj3"/>
+              <a:gd fmla="val 43750" name="adj4"/>
+            </a:avLst>
+          </a:prstGeom>
+          <a:solidFill>
+            <a:schemeClr val="lt2"/>
+          </a:solidFill>
+          <a:ln cap="flat" cmpd="sng" w="9525">
+            <a:solidFill>
+              <a:schemeClr val="dk2"/>
+            </a:solidFill>
+            <a:prstDash val="solid"/>
+            <a:round/>
+            <a:headEnd len="sm" w="sm" type="none"/>
+            <a:tailEnd len="sm" w="sm" type="none"/>
+          </a:ln>
+        </p:spPr>
+        <p:txBody>
+          <a:bodyPr anchorCtr="0" anchor="ctr" bIns="91425" lIns="91425" spcFirstLastPara="1" rIns="91425" wrap="square" tIns="91425">
+            <a:noAutofit/>
+          </a:bodyPr>
+          <a:lstStyle/>
+          <a:p>
+            <a:pPr indent="0" lvl="0" marL="0" rtl="0" algn="l">
+              <a:spcBef>
+                <a:spcPts val="0"/>
+              </a:spcBef>
+              <a:spcAft>
+                <a:spcPts val="0"/>
+              </a:spcAft>
+              <a:buNone/>
+            </a:pPr>
+            <a:r>
+              <a:t/>
+            </a:r>
+            <a:endParaRPr/>
+          </a:p>
+        </p:txBody>
+      </p:sp>
+    </p:spTree>
+  </p:cSld>
+  <p:clrMapOvr>
+    <a:masterClrMapping/>
+  </p:clrMapOvr>
+</p:sld>
+</file>
+
+<file path=ppt/slides/slide5.xml><?xml version="1.0" encoding="utf-8"?>
+<p:sld xmlns:a="http://schemas.openxmlformats.org/drawingml/2006/main" xmlns:r="http://schemas.openxmlformats.org/officeDocument/2006/relationships" xmlns:mc="http://schemas.openxmlformats.org/markup-compatibility/2006" xmlns:mv="urn:schemas-microsoft-com:mac:vml" xmlns:p="http://schemas.openxmlformats.org/presentationml/2006/main" xmlns:c="http://schemas.openxmlformats.org/drawingml/2006/chart" xmlns:dgm="http://schemas.openxmlformats.org/drawingml/2006/diagram" xmlns:o="urn:schemas-microsoft-com:office:office" xmlns:v="urn:schemas-microsoft-com:vml" xmlns:pvml="urn:schemas-microsoft-com:office:powerpoint" xmlns:com="http://schemas.openxmlformats.org/drawingml/2006/compatibility" xmlns:p14="http://schemas.microsoft.com/office/powerpoint/2010/main" xmlns:p15="http://schemas.microsoft.com/office/powerpoint/2012/main">
+  <p:cSld>
+    <p:spTree>
+      <p:nvGrpSpPr>
+        <p:cNvPr id="86" name="Shape 86"/>
+        <p:cNvGrpSpPr/>
+        <p:nvPr/>
+      </p:nvGrpSpPr>
+      <p:grpSpPr>
+        <a:xfrm>
+          <a:off x="0" y="0"/>
+          <a:ext cx="0" cy="0"/>
+          <a:chOff x="0" y="0"/>
+          <a:chExt cx="0" cy="0"/>
+        </a:xfrm>
+      </p:grpSpPr>
+      <p:sp>
+        <p:nvSpPr>
+          <p:cNvPr id="87" name="Google Shape;87;p17"/>
           <p:cNvSpPr txBox="1"/>
           <p:nvPr>
             <p:ph type="title"/>
@@ -7936,7 +8716,7 @@
             </a:pPr>
             <a:r>
               <a:rPr lang="en"/>
-              <a:t>Client Needs</a:t>
+              <a:t>Project Requirements</a:t>
             </a:r>
             <a:endParaRPr/>
           </a:p>
@@ -7944,7 +8724,7 @@
       </p:sp>
       <p:sp>
         <p:nvSpPr>
-          <p:cNvPr id="78" name="Google Shape;78;p16"/>
+          <p:cNvPr id="88" name="Google Shape;88;p17"/>
           <p:cNvSpPr txBox="1"/>
           <p:nvPr>
             <p:ph idx="1" type="body"/>
@@ -7953,7 +8733,7 @@
         <p:spPr>
           <a:xfrm>
             <a:off x="311700" y="1152475"/>
-            <a:ext cx="8520600" cy="3416400"/>
+            <a:ext cx="4260300" cy="3416400"/>
           </a:xfrm>
           <a:prstGeom prst="rect">
             <a:avLst/>
@@ -7965,42 +8745,451 @@
           </a:bodyPr>
           <a:lstStyle/>
           <a:p>
-            <a:pPr indent="0" lvl="0" marL="0" rtl="0" algn="l">
-              <a:spcBef>
-                <a:spcPts val="0"/>
-              </a:spcBef>
-              <a:spcAft>
-                <a:spcPts val="0"/>
-              </a:spcAft>
-              <a:buNone/>
+            <a:pPr indent="-342900" lvl="0" marL="457200" rtl="0" algn="l">
+              <a:spcBef>
+                <a:spcPts val="0"/>
+              </a:spcBef>
+              <a:spcAft>
+                <a:spcPts val="0"/>
+              </a:spcAft>
+              <a:buSzPts val="1800"/>
+              <a:buChar char="❏"/>
             </a:pPr>
             <a:r>
               <a:rPr lang="en"/>
-              <a:t>The Client will serve as a </a:t>
-            </a:r>
-            <a:r>
-              <a:rPr lang="en"/>
-              <a:t>liaison</a:t>
-            </a:r>
-            <a:r>
-              <a:rPr lang="en"/>
-              <a:t> to the military and as a sounding board and mentor. </a:t>
+              <a:t>Front End Design</a:t>
             </a:r>
             <a:endParaRPr/>
           </a:p>
           <a:p>
-            <a:pPr indent="0" lvl="0" marL="0" rtl="0" algn="l">
-              <a:spcBef>
-                <a:spcPts val="1600"/>
-              </a:spcBef>
-              <a:spcAft>
-                <a:spcPts val="1600"/>
-              </a:spcAft>
-              <a:buNone/>
+            <a:pPr indent="-317500" lvl="1" marL="914400" rtl="0" algn="l">
+              <a:spcBef>
+                <a:spcPts val="0"/>
+              </a:spcBef>
+              <a:spcAft>
+                <a:spcPts val="0"/>
+              </a:spcAft>
+              <a:buSzPts val="1400"/>
+              <a:buChar char="❏"/>
             </a:pPr>
             <a:r>
               <a:rPr lang="en"/>
-              <a:t>The website will not be built specifically for the client, but the client will have major say in what features are useful and mandatory. </a:t>
+              <a:t>Landing Page</a:t>
+            </a:r>
+            <a:endParaRPr/>
+          </a:p>
+          <a:p>
+            <a:pPr indent="-317500" lvl="1" marL="914400" rtl="0" algn="l">
+              <a:spcBef>
+                <a:spcPts val="0"/>
+              </a:spcBef>
+              <a:spcAft>
+                <a:spcPts val="0"/>
+              </a:spcAft>
+              <a:buSzPts val="1400"/>
+              <a:buChar char="❏"/>
+            </a:pPr>
+            <a:r>
+              <a:rPr lang="en"/>
+              <a:t>About Us</a:t>
+            </a:r>
+            <a:endParaRPr/>
+          </a:p>
+          <a:p>
+            <a:pPr indent="-317500" lvl="1" marL="914400" rtl="0" algn="l">
+              <a:spcBef>
+                <a:spcPts val="0"/>
+              </a:spcBef>
+              <a:spcAft>
+                <a:spcPts val="0"/>
+              </a:spcAft>
+              <a:buSzPts val="1400"/>
+              <a:buChar char="❏"/>
+            </a:pPr>
+            <a:r>
+              <a:rPr lang="en"/>
+              <a:t>Contact Us</a:t>
+            </a:r>
+            <a:endParaRPr/>
+          </a:p>
+          <a:p>
+            <a:pPr indent="-317500" lvl="1" marL="914400" rtl="0" algn="l">
+              <a:spcBef>
+                <a:spcPts val="0"/>
+              </a:spcBef>
+              <a:spcAft>
+                <a:spcPts val="0"/>
+              </a:spcAft>
+              <a:buSzPts val="1400"/>
+              <a:buChar char="❏"/>
+            </a:pPr>
+            <a:r>
+              <a:rPr lang="en"/>
+              <a:t>Inventory</a:t>
+            </a:r>
+            <a:endParaRPr/>
+          </a:p>
+          <a:p>
+            <a:pPr indent="-317500" lvl="2" marL="1371600" rtl="0" algn="l">
+              <a:spcBef>
+                <a:spcPts val="0"/>
+              </a:spcBef>
+              <a:spcAft>
+                <a:spcPts val="0"/>
+              </a:spcAft>
+              <a:buSzPts val="1400"/>
+              <a:buChar char="❏"/>
+            </a:pPr>
+            <a:r>
+              <a:rPr lang="en"/>
+              <a:t>Datatable</a:t>
+            </a:r>
+            <a:endParaRPr/>
+          </a:p>
+          <a:p>
+            <a:pPr indent="-317500" lvl="3" marL="1828800" rtl="0" algn="l">
+              <a:spcBef>
+                <a:spcPts val="0"/>
+              </a:spcBef>
+              <a:spcAft>
+                <a:spcPts val="0"/>
+              </a:spcAft>
+              <a:buSzPts val="1400"/>
+              <a:buChar char="❏"/>
+            </a:pPr>
+            <a:r>
+              <a:rPr lang="en"/>
+              <a:t>Partial View for vehicle</a:t>
+            </a:r>
+            <a:endParaRPr/>
+          </a:p>
+          <a:p>
+            <a:pPr indent="-317500" lvl="1" marL="914400" rtl="0" algn="l">
+              <a:spcBef>
+                <a:spcPts val="0"/>
+              </a:spcBef>
+              <a:spcAft>
+                <a:spcPts val="0"/>
+              </a:spcAft>
+              <a:buSzPts val="1400"/>
+              <a:buChar char="❏"/>
+            </a:pPr>
+            <a:r>
+              <a:rPr lang="en"/>
+              <a:t>Sell / Trade In</a:t>
+            </a:r>
+            <a:endParaRPr/>
+          </a:p>
+          <a:p>
+            <a:pPr indent="-317500" lvl="1" marL="914400" rtl="0" algn="l">
+              <a:spcBef>
+                <a:spcPts val="0"/>
+              </a:spcBef>
+              <a:spcAft>
+                <a:spcPts val="0"/>
+              </a:spcAft>
+              <a:buSzPts val="1400"/>
+              <a:buChar char="❏"/>
+            </a:pPr>
+            <a:r>
+              <a:rPr lang="en"/>
+              <a:t>Financing</a:t>
+            </a:r>
+            <a:endParaRPr/>
+          </a:p>
+          <a:p>
+            <a:pPr indent="-317500" lvl="1" marL="914400" rtl="0" algn="l">
+              <a:spcBef>
+                <a:spcPts val="0"/>
+              </a:spcBef>
+              <a:spcAft>
+                <a:spcPts val="0"/>
+              </a:spcAft>
+              <a:buSzPts val="1400"/>
+              <a:buChar char="❏"/>
+            </a:pPr>
+            <a:r>
+              <a:rPr lang="en"/>
+              <a:t>Dashboard</a:t>
+            </a:r>
+            <a:endParaRPr/>
+          </a:p>
+          <a:p>
+            <a:pPr indent="-342900" lvl="0" marL="457200" rtl="0" algn="l">
+              <a:spcBef>
+                <a:spcPts val="0"/>
+              </a:spcBef>
+              <a:spcAft>
+                <a:spcPts val="0"/>
+              </a:spcAft>
+              <a:buSzPts val="1800"/>
+              <a:buChar char="❏"/>
+            </a:pPr>
+            <a:r>
+              <a:rPr lang="en"/>
+              <a:t>Roles</a:t>
+            </a:r>
+            <a:endParaRPr/>
+          </a:p>
+          <a:p>
+            <a:pPr indent="-317500" lvl="1" marL="914400" rtl="0" algn="l">
+              <a:spcBef>
+                <a:spcPts val="0"/>
+              </a:spcBef>
+              <a:spcAft>
+                <a:spcPts val="0"/>
+              </a:spcAft>
+              <a:buSzPts val="1400"/>
+              <a:buChar char="❏"/>
+            </a:pPr>
+            <a:r>
+              <a:rPr lang="en"/>
+              <a:t>Login system </a:t>
+            </a:r>
+            <a:endParaRPr/>
+          </a:p>
+          <a:p>
+            <a:pPr indent="-317500" lvl="1" marL="914400" rtl="0" algn="l">
+              <a:spcBef>
+                <a:spcPts val="0"/>
+              </a:spcBef>
+              <a:spcAft>
+                <a:spcPts val="0"/>
+              </a:spcAft>
+              <a:buSzPts val="1400"/>
+              <a:buChar char="❏"/>
+            </a:pPr>
+            <a:r>
+              <a:rPr lang="en"/>
+              <a:t>Show/Hide</a:t>
+            </a:r>
+            <a:endParaRPr/>
+          </a:p>
+        </p:txBody>
+      </p:sp>
+      <p:sp>
+        <p:nvSpPr>
+          <p:cNvPr id="89" name="Google Shape;89;p17"/>
+          <p:cNvSpPr txBox="1"/>
+          <p:nvPr>
+            <p:ph idx="1" type="body"/>
+          </p:nvPr>
+        </p:nvSpPr>
+        <p:spPr>
+          <a:xfrm>
+            <a:off x="4472875" y="1152475"/>
+            <a:ext cx="4260300" cy="3416400"/>
+          </a:xfrm>
+          <a:prstGeom prst="rect">
+            <a:avLst/>
+          </a:prstGeom>
+        </p:spPr>
+        <p:txBody>
+          <a:bodyPr anchorCtr="0" anchor="t" bIns="91425" lIns="91425" spcFirstLastPara="1" rIns="91425" wrap="square" tIns="91425">
+            <a:noAutofit/>
+          </a:bodyPr>
+          <a:lstStyle/>
+          <a:p>
+            <a:pPr indent="-342900" lvl="0" marL="457200" rtl="0" algn="l">
+              <a:spcBef>
+                <a:spcPts val="0"/>
+              </a:spcBef>
+              <a:spcAft>
+                <a:spcPts val="0"/>
+              </a:spcAft>
+              <a:buSzPts val="1800"/>
+              <a:buChar char="❏"/>
+            </a:pPr>
+            <a:r>
+              <a:rPr lang="en"/>
+              <a:t>Dashboard</a:t>
+            </a:r>
+            <a:endParaRPr/>
+          </a:p>
+          <a:p>
+            <a:pPr indent="-317500" lvl="1" marL="914400" rtl="0" algn="l">
+              <a:spcBef>
+                <a:spcPts val="0"/>
+              </a:spcBef>
+              <a:spcAft>
+                <a:spcPts val="0"/>
+              </a:spcAft>
+              <a:buSzPts val="1400"/>
+              <a:buChar char="❏"/>
+            </a:pPr>
+            <a:r>
+              <a:rPr lang="en"/>
+              <a:t>Inventory CRUD</a:t>
+            </a:r>
+            <a:endParaRPr/>
+          </a:p>
+          <a:p>
+            <a:pPr indent="-317500" lvl="1" marL="914400" rtl="0" algn="l">
+              <a:spcBef>
+                <a:spcPts val="0"/>
+              </a:spcBef>
+              <a:spcAft>
+                <a:spcPts val="0"/>
+              </a:spcAft>
+              <a:buSzPts val="1400"/>
+              <a:buChar char="❏"/>
+            </a:pPr>
+            <a:r>
+              <a:rPr lang="en"/>
+              <a:t>Photo CRUD</a:t>
+            </a:r>
+            <a:endParaRPr/>
+          </a:p>
+          <a:p>
+            <a:pPr indent="-342900" lvl="0" marL="457200" rtl="0" algn="l">
+              <a:spcBef>
+                <a:spcPts val="0"/>
+              </a:spcBef>
+              <a:spcAft>
+                <a:spcPts val="0"/>
+              </a:spcAft>
+              <a:buSzPts val="1800"/>
+              <a:buChar char="❏"/>
+            </a:pPr>
+            <a:r>
+              <a:rPr lang="en"/>
+              <a:t>Database Design</a:t>
+            </a:r>
+            <a:endParaRPr/>
+          </a:p>
+          <a:p>
+            <a:pPr indent="-317500" lvl="1" marL="914400" rtl="0" algn="l">
+              <a:spcBef>
+                <a:spcPts val="0"/>
+              </a:spcBef>
+              <a:spcAft>
+                <a:spcPts val="0"/>
+              </a:spcAft>
+              <a:buSzPts val="1400"/>
+              <a:buChar char="❏"/>
+            </a:pPr>
+            <a:r>
+              <a:rPr lang="en"/>
+              <a:t>Inventory Table</a:t>
+            </a:r>
+            <a:endParaRPr/>
+          </a:p>
+          <a:p>
+            <a:pPr indent="-317500" lvl="1" marL="914400" rtl="0" algn="l">
+              <a:spcBef>
+                <a:spcPts val="0"/>
+              </a:spcBef>
+              <a:spcAft>
+                <a:spcPts val="0"/>
+              </a:spcAft>
+              <a:buSzPts val="1400"/>
+              <a:buChar char="❏"/>
+            </a:pPr>
+            <a:r>
+              <a:rPr lang="en"/>
+              <a:t>Photo Table</a:t>
+            </a:r>
+            <a:endParaRPr/>
+          </a:p>
+          <a:p>
+            <a:pPr indent="-317500" lvl="1" marL="914400" rtl="0" algn="l">
+              <a:spcBef>
+                <a:spcPts val="0"/>
+              </a:spcBef>
+              <a:spcAft>
+                <a:spcPts val="0"/>
+              </a:spcAft>
+              <a:buSzPts val="1400"/>
+              <a:buChar char="❏"/>
+            </a:pPr>
+            <a:r>
+              <a:rPr lang="en"/>
+              <a:t>Photo Lookup Table</a:t>
+            </a:r>
+            <a:endParaRPr/>
+          </a:p>
+          <a:p>
+            <a:pPr indent="-342900" lvl="0" marL="457200" rtl="0" algn="l">
+              <a:spcBef>
+                <a:spcPts val="0"/>
+              </a:spcBef>
+              <a:spcAft>
+                <a:spcPts val="0"/>
+              </a:spcAft>
+              <a:buSzPts val="1800"/>
+              <a:buChar char="❏"/>
+            </a:pPr>
+            <a:r>
+              <a:rPr lang="en"/>
+              <a:t>Back End</a:t>
+            </a:r>
+            <a:endParaRPr/>
+          </a:p>
+          <a:p>
+            <a:pPr indent="-317500" lvl="1" marL="914400" rtl="0" algn="l">
+              <a:spcBef>
+                <a:spcPts val="0"/>
+              </a:spcBef>
+              <a:spcAft>
+                <a:spcPts val="0"/>
+              </a:spcAft>
+              <a:buSzPts val="1400"/>
+              <a:buChar char="❏"/>
+            </a:pPr>
+            <a:r>
+              <a:rPr lang="en"/>
+              <a:t>Entity Framework</a:t>
+            </a:r>
+            <a:endParaRPr/>
+          </a:p>
+          <a:p>
+            <a:pPr indent="-342900" lvl="0" marL="457200" rtl="0" algn="l">
+              <a:spcBef>
+                <a:spcPts val="0"/>
+              </a:spcBef>
+              <a:spcAft>
+                <a:spcPts val="0"/>
+              </a:spcAft>
+              <a:buSzPts val="1800"/>
+              <a:buChar char="❏"/>
+            </a:pPr>
+            <a:r>
+              <a:rPr lang="en"/>
+              <a:t>Hosting</a:t>
+            </a:r>
+            <a:endParaRPr/>
+          </a:p>
+          <a:p>
+            <a:pPr indent="-317500" lvl="1" marL="914400" rtl="0" algn="l">
+              <a:spcBef>
+                <a:spcPts val="0"/>
+              </a:spcBef>
+              <a:spcAft>
+                <a:spcPts val="0"/>
+              </a:spcAft>
+              <a:buSzPts val="1400"/>
+              <a:buChar char="❏"/>
+            </a:pPr>
+            <a:r>
+              <a:rPr lang="en"/>
+              <a:t>Server</a:t>
+            </a:r>
+            <a:endParaRPr/>
+          </a:p>
+          <a:p>
+            <a:pPr indent="-317500" lvl="1" marL="914400" rtl="0" algn="l">
+              <a:spcBef>
+                <a:spcPts val="0"/>
+              </a:spcBef>
+              <a:spcAft>
+                <a:spcPts val="0"/>
+              </a:spcAft>
+              <a:buSzPts val="1400"/>
+              <a:buChar char="❏"/>
+            </a:pPr>
+            <a:r>
+              <a:rPr lang="en"/>
+              <a:t>Domain Registration</a:t>
             </a:r>
             <a:endParaRPr/>
           </a:p>
@@ -8014,12 +9203,12 @@
 </p:sld>
 </file>
 
-<file path=ppt/slides/slide5.xml><?xml version="1.0" encoding="utf-8"?>
+<file path=ppt/slides/slide6.xml><?xml version="1.0" encoding="utf-8"?>
 <p:sld xmlns:a="http://schemas.openxmlformats.org/drawingml/2006/main" xmlns:r="http://schemas.openxmlformats.org/officeDocument/2006/relationships" xmlns:mc="http://schemas.openxmlformats.org/markup-compatibility/2006" xmlns:mv="urn:schemas-microsoft-com:mac:vml" xmlns:p="http://schemas.openxmlformats.org/presentationml/2006/main" xmlns:c="http://schemas.openxmlformats.org/drawingml/2006/chart" xmlns:dgm="http://schemas.openxmlformats.org/drawingml/2006/diagram" xmlns:o="urn:schemas-microsoft-com:office:office" xmlns:v="urn:schemas-microsoft-com:vml" xmlns:pvml="urn:schemas-microsoft-com:office:powerpoint" xmlns:com="http://schemas.openxmlformats.org/drawingml/2006/compatibility" xmlns:p14="http://schemas.microsoft.com/office/powerpoint/2010/main" xmlns:p15="http://schemas.microsoft.com/office/powerpoint/2012/main">
   <p:cSld>
     <p:spTree>
       <p:nvGrpSpPr>
-        <p:cNvPr id="82" name="Shape 82"/>
+        <p:cNvPr id="93" name="Shape 93"/>
         <p:cNvGrpSpPr/>
         <p:nvPr/>
       </p:nvGrpSpPr>
@@ -8033,7 +9222,7 @@
       </p:grpSpPr>
       <p:sp>
         <p:nvSpPr>
-          <p:cNvPr id="83" name="Google Shape;83;p17"/>
+          <p:cNvPr id="94" name="Google Shape;94;p18"/>
           <p:cNvSpPr txBox="1"/>
           <p:nvPr>
             <p:ph type="title"/>
@@ -8065,7 +9254,7 @@
             </a:pPr>
             <a:r>
               <a:rPr lang="en"/>
-              <a:t>Main Objectives</a:t>
+              <a:t>Methodology</a:t>
             </a:r>
             <a:endParaRPr/>
           </a:p>
@@ -8073,7 +9262,7 @@
       </p:sp>
       <p:sp>
         <p:nvSpPr>
-          <p:cNvPr id="84" name="Google Shape;84;p17"/>
+          <p:cNvPr id="95" name="Google Shape;95;p18"/>
           <p:cNvSpPr txBox="1"/>
           <p:nvPr>
             <p:ph idx="1" type="body"/>
@@ -8094,7 +9283,54 @@
           </a:bodyPr>
           <a:lstStyle/>
           <a:p>
-            <a:pPr indent="-342900" lvl="0" marL="457200" rtl="0" algn="l">
+            <a:pPr indent="-342900" lvl="0" marL="457200" marR="0" rtl="0" algn="l">
+              <a:lnSpc>
+                <a:spcPct val="115000"/>
+              </a:lnSpc>
+              <a:spcBef>
+                <a:spcPts val="0"/>
+              </a:spcBef>
+              <a:spcAft>
+                <a:spcPts val="0"/>
+              </a:spcAft>
+              <a:buClr>
+                <a:schemeClr val="dk2"/>
+              </a:buClr>
+              <a:buSzPts val="1800"/>
+              <a:buFont typeface="Lato"/>
+              <a:buChar char="❏"/>
+            </a:pPr>
+            <a:r>
+              <a:rPr lang="en"/>
+              <a:t>ASP.NET Model View Controller</a:t>
+            </a:r>
+            <a:endParaRPr/>
+          </a:p>
+          <a:p>
+            <a:pPr indent="-317500" lvl="1" marL="914400" marR="0" rtl="0" algn="l">
+              <a:lnSpc>
+                <a:spcPct val="115000"/>
+              </a:lnSpc>
+              <a:spcBef>
+                <a:spcPts val="0"/>
+              </a:spcBef>
+              <a:spcAft>
+                <a:spcPts val="0"/>
+              </a:spcAft>
+              <a:buSzPts val="1400"/>
+              <a:buChar char="❏"/>
+            </a:pPr>
+            <a:r>
+              <a:rPr lang="en"/>
+              <a:t>Visual Studio / C#</a:t>
+            </a:r>
+            <a:endParaRPr/>
+          </a:p>
+          <a:p>
+            <a:pPr indent="-342900" lvl="0" marL="457200" marR="0" rtl="0" algn="l">
+              <a:lnSpc>
+                <a:spcPct val="115000"/>
+              </a:lnSpc>
               <a:spcBef>
                 <a:spcPts val="0"/>
               </a:spcBef>
@@ -8106,12 +9342,103 @@
             </a:pPr>
             <a:r>
               <a:rPr lang="en"/>
-              <a:t>Create website skeleton / design</a:t>
+              <a:t>Javascript </a:t>
             </a:r>
             <a:endParaRPr/>
           </a:p>
           <a:p>
-            <a:pPr indent="-342900" lvl="0" marL="457200" rtl="0" algn="l">
+            <a:pPr indent="-317500" lvl="1" marL="914400" marR="0" rtl="0" algn="l">
+              <a:lnSpc>
+                <a:spcPct val="115000"/>
+              </a:lnSpc>
+              <a:spcBef>
+                <a:spcPts val="0"/>
+              </a:spcBef>
+              <a:spcAft>
+                <a:spcPts val="0"/>
+              </a:spcAft>
+              <a:buSzPts val="1400"/>
+              <a:buChar char="❏"/>
+            </a:pPr>
+            <a:r>
+              <a:rPr lang="en"/>
+              <a:t>Vue JS Framework</a:t>
+            </a:r>
+            <a:endParaRPr/>
+          </a:p>
+          <a:p>
+            <a:pPr indent="-317500" lvl="1" marL="914400" rtl="0" algn="l">
+              <a:spcBef>
+                <a:spcPts val="0"/>
+              </a:spcBef>
+              <a:spcAft>
+                <a:spcPts val="0"/>
+              </a:spcAft>
+              <a:buSzPts val="1400"/>
+              <a:buChar char="❏"/>
+            </a:pPr>
+            <a:r>
+              <a:rPr lang="en"/>
+              <a:t>Ajax / JSON</a:t>
+            </a:r>
+            <a:endParaRPr/>
+          </a:p>
+          <a:p>
+            <a:pPr indent="-317500" lvl="1" marL="914400" rtl="0" algn="l">
+              <a:spcBef>
+                <a:spcPts val="0"/>
+              </a:spcBef>
+              <a:spcAft>
+                <a:spcPts val="0"/>
+              </a:spcAft>
+              <a:buSzPts val="1400"/>
+              <a:buChar char="❏"/>
+            </a:pPr>
+            <a:r>
+              <a:rPr lang="en"/>
+              <a:t>Datatables</a:t>
+            </a:r>
+            <a:endParaRPr/>
+          </a:p>
+          <a:p>
+            <a:pPr indent="-317500" lvl="1" marL="914400" rtl="0" algn="l">
+              <a:spcBef>
+                <a:spcPts val="0"/>
+              </a:spcBef>
+              <a:spcAft>
+                <a:spcPts val="0"/>
+              </a:spcAft>
+              <a:buSzPts val="1400"/>
+              <a:buChar char="❏"/>
+            </a:pPr>
+            <a:r>
+              <a:rPr lang="en"/>
+              <a:t>JQuery</a:t>
+            </a:r>
+            <a:endParaRPr/>
+          </a:p>
+          <a:p>
+            <a:pPr indent="-317500" lvl="1" marL="914400" rtl="0" algn="l">
+              <a:spcBef>
+                <a:spcPts val="0"/>
+              </a:spcBef>
+              <a:spcAft>
+                <a:spcPts val="0"/>
+              </a:spcAft>
+              <a:buSzPts val="1400"/>
+              <a:buChar char="❏"/>
+            </a:pPr>
+            <a:r>
+              <a:rPr lang="en"/>
+              <a:t>Dropzone.JS</a:t>
+            </a:r>
+            <a:endParaRPr/>
+          </a:p>
+          <a:p>
+            <a:pPr indent="-342900" lvl="0" marL="457200" marR="0" rtl="0" algn="l">
+              <a:lnSpc>
+                <a:spcPct val="115000"/>
+              </a:lnSpc>
               <a:spcBef>
                 <a:spcPts val="0"/>
               </a:spcBef>
@@ -8123,12 +9450,35 @@
             </a:pPr>
             <a:r>
               <a:rPr lang="en"/>
-              <a:t>Find Server</a:t>
+              <a:t>HTML / CSS</a:t>
             </a:r>
             <a:endParaRPr/>
           </a:p>
           <a:p>
-            <a:pPr indent="-342900" lvl="0" marL="457200" rtl="0" algn="l">
+            <a:pPr indent="-317500" lvl="1" marL="914400" marR="0" rtl="0" algn="l">
+              <a:lnSpc>
+                <a:spcPct val="115000"/>
+              </a:lnSpc>
+              <a:spcBef>
+                <a:spcPts val="0"/>
+              </a:spcBef>
+              <a:spcAft>
+                <a:spcPts val="0"/>
+              </a:spcAft>
+              <a:buSzPts val="1400"/>
+              <a:buChar char="❏"/>
+            </a:pPr>
+            <a:r>
+              <a:rPr lang="en"/>
+              <a:t>Bootstrap</a:t>
+            </a:r>
+            <a:endParaRPr/>
+          </a:p>
+          <a:p>
+            <a:pPr indent="-342900" lvl="0" marL="457200" marR="0" rtl="0" algn="l">
+              <a:lnSpc>
+                <a:spcPct val="115000"/>
+              </a:lnSpc>
               <a:spcBef>
                 <a:spcPts val="0"/>
               </a:spcBef>
@@ -8140,12 +9490,15 @@
             </a:pPr>
             <a:r>
               <a:rPr lang="en"/>
-              <a:t>Create profile system</a:t>
+              <a:t>SQL Server</a:t>
             </a:r>
             <a:endParaRPr/>
           </a:p>
           <a:p>
-            <a:pPr indent="-342900" lvl="0" marL="457200" rtl="0" algn="l">
+            <a:pPr indent="-342900" lvl="0" marL="457200" marR="0" rtl="0" algn="l">
+              <a:lnSpc>
+                <a:spcPct val="115000"/>
+              </a:lnSpc>
               <a:spcBef>
                 <a:spcPts val="0"/>
               </a:spcBef>
@@ -8157,92 +9510,45 @@
             </a:pPr>
             <a:r>
               <a:rPr lang="en"/>
-              <a:t>Create voting system</a:t>
+              <a:t>Entity Framework</a:t>
             </a:r>
             <a:endParaRPr/>
           </a:p>
           <a:p>
-            <a:pPr indent="-342900" lvl="0" marL="457200" rtl="0" algn="l">
-              <a:spcBef>
-                <a:spcPts val="0"/>
-              </a:spcBef>
-              <a:spcAft>
-                <a:spcPts val="0"/>
-              </a:spcAft>
-              <a:buSzPts val="1800"/>
+            <a:pPr indent="-317500" lvl="1" marL="914400" marR="0" rtl="0" algn="l">
+              <a:lnSpc>
+                <a:spcPct val="115000"/>
+              </a:lnSpc>
+              <a:spcBef>
+                <a:spcPts val="0"/>
+              </a:spcBef>
+              <a:spcAft>
+                <a:spcPts val="0"/>
+              </a:spcAft>
+              <a:buSzPts val="1400"/>
               <a:buChar char="❏"/>
             </a:pPr>
             <a:r>
               <a:rPr lang="en"/>
-              <a:t>Create database to host content</a:t>
+              <a:t>Linq</a:t>
             </a:r>
             <a:endParaRPr/>
           </a:p>
           <a:p>
-            <a:pPr indent="-342900" lvl="0" marL="457200" rtl="0" algn="l">
-              <a:spcBef>
-                <a:spcPts val="0"/>
-              </a:spcBef>
-              <a:spcAft>
-                <a:spcPts val="0"/>
-              </a:spcAft>
-              <a:buSzPts val="1800"/>
-              <a:buChar char="❏"/>
+            <a:pPr indent="0" lvl="0" marL="914400" marR="0" rtl="0" algn="l">
+              <a:lnSpc>
+                <a:spcPct val="115000"/>
+              </a:lnSpc>
+              <a:spcBef>
+                <a:spcPts val="1600"/>
+              </a:spcBef>
+              <a:spcAft>
+                <a:spcPts val="1600"/>
+              </a:spcAft>
+              <a:buNone/>
             </a:pPr>
             <a:r>
-              <a:rPr lang="en"/>
-              <a:t>Create link allowing users to submit content</a:t>
-            </a:r>
-            <a:endParaRPr/>
-          </a:p>
-          <a:p>
-            <a:pPr indent="-342900" lvl="0" marL="457200" rtl="0" algn="l">
-              <a:spcBef>
-                <a:spcPts val="0"/>
-              </a:spcBef>
-              <a:spcAft>
-                <a:spcPts val="0"/>
-              </a:spcAft>
-              <a:buSzPts val="1800"/>
-              <a:buChar char="❏"/>
-            </a:pPr>
-            <a:r>
-              <a:rPr lang="en"/>
-              <a:t>Allow viewing/previewing of content online before downloading content</a:t>
-            </a:r>
-            <a:endParaRPr/>
-          </a:p>
-          <a:p>
-            <a:pPr indent="-342900" lvl="0" marL="457200" rtl="0" algn="l">
-              <a:spcBef>
-                <a:spcPts val="0"/>
-              </a:spcBef>
-              <a:spcAft>
-                <a:spcPts val="0"/>
-              </a:spcAft>
-              <a:buSzPts val="1800"/>
-              <a:buChar char="❏"/>
-            </a:pPr>
-            <a:r>
-              <a:rPr lang="en"/>
-              <a:t>Security!!!</a:t>
-            </a:r>
-            <a:endParaRPr/>
-          </a:p>
-          <a:p>
-            <a:pPr indent="-342900" lvl="0" marL="457200" rtl="0" algn="l">
-              <a:spcBef>
-                <a:spcPts val="0"/>
-              </a:spcBef>
-              <a:spcAft>
-                <a:spcPts val="0"/>
-              </a:spcAft>
-              <a:buSzPts val="1800"/>
-              <a:buChar char="❏"/>
-            </a:pPr>
-            <a:r>
-              <a:rPr lang="en"/>
-              <a:t>Find cooperating veteran-run sponsors to help advertise site and garner interest. </a:t>
+              <a:t/>
             </a:r>
             <a:endParaRPr/>
           </a:p>
@@ -8256,12 +9562,12 @@
 </p:sld>
 </file>
 
-<file path=ppt/slides/slide6.xml><?xml version="1.0" encoding="utf-8"?>
+<file path=ppt/slides/slide7.xml><?xml version="1.0" encoding="utf-8"?>
 <p:sld xmlns:a="http://schemas.openxmlformats.org/drawingml/2006/main" xmlns:r="http://schemas.openxmlformats.org/officeDocument/2006/relationships" xmlns:mc="http://schemas.openxmlformats.org/markup-compatibility/2006" xmlns:mv="urn:schemas-microsoft-com:mac:vml" xmlns:p="http://schemas.openxmlformats.org/presentationml/2006/main" xmlns:c="http://schemas.openxmlformats.org/drawingml/2006/chart" xmlns:dgm="http://schemas.openxmlformats.org/drawingml/2006/diagram" xmlns:o="urn:schemas-microsoft-com:office:office" xmlns:v="urn:schemas-microsoft-com:vml" xmlns:pvml="urn:schemas-microsoft-com:office:powerpoint" xmlns:com="http://schemas.openxmlformats.org/drawingml/2006/compatibility" xmlns:p14="http://schemas.microsoft.com/office/powerpoint/2010/main" xmlns:p15="http://schemas.microsoft.com/office/powerpoint/2012/main">
   <p:cSld>
     <p:spTree>
       <p:nvGrpSpPr>
-        <p:cNvPr id="88" name="Shape 88"/>
+        <p:cNvPr id="99" name="Shape 99"/>
         <p:cNvGrpSpPr/>
         <p:nvPr/>
       </p:nvGrpSpPr>
@@ -8275,7 +9581,7 @@
       </p:grpSpPr>
       <p:sp>
         <p:nvSpPr>
-          <p:cNvPr id="89" name="Google Shape;89;p18"/>
+          <p:cNvPr id="100" name="Google Shape;100;p19"/>
           <p:cNvSpPr txBox="1"/>
           <p:nvPr>
             <p:ph type="title"/>
@@ -8307,7 +9613,7 @@
             </a:pPr>
             <a:r>
               <a:rPr lang="en"/>
-              <a:t>Main Objective Progress</a:t>
+              <a:t>Timeline</a:t>
             </a:r>
             <a:endParaRPr/>
           </a:p>
@@ -8315,7 +9621,7 @@
       </p:sp>
       <p:sp>
         <p:nvSpPr>
-          <p:cNvPr id="90" name="Google Shape;90;p18"/>
+          <p:cNvPr id="101" name="Google Shape;101;p19"/>
           <p:cNvSpPr txBox="1"/>
           <p:nvPr>
             <p:ph idx="1" type="body"/>
@@ -8336,7 +9642,10 @@
           </a:bodyPr>
           <a:lstStyle/>
           <a:p>
-            <a:pPr indent="-342900" lvl="0" marL="457200" rtl="0" algn="l">
+            <a:pPr indent="-342900" lvl="0" marL="457200" marR="0" rtl="0" algn="l">
+              <a:lnSpc>
+                <a:spcPct val="115000"/>
+              </a:lnSpc>
               <a:spcBef>
                 <a:spcPts val="0"/>
               </a:spcBef>
@@ -8348,29 +9657,15 @@
             </a:pPr>
             <a:r>
               <a:rPr lang="en"/>
-              <a:t>Create website skeleton / design</a:t>
+              <a:t>Complete Log in / Roles / Access (Early November)</a:t>
             </a:r>
             <a:endParaRPr/>
           </a:p>
           <a:p>
-            <a:pPr indent="-317500" lvl="1" marL="914400" rtl="0" algn="l">
-              <a:spcBef>
-                <a:spcPts val="0"/>
-              </a:spcBef>
-              <a:spcAft>
-                <a:spcPts val="0"/>
-              </a:spcAft>
-              <a:buSzPts val="1400"/>
-              <a:buChar char="❏"/>
-            </a:pPr>
-            <a:r>
-              <a:rPr lang="en"/>
-              <a:t>Create basic HTML/CSS templates. Focus on design after functionality is established</a:t>
-            </a:r>
-            <a:endParaRPr/>
-          </a:p>
-          <a:p>
-            <a:pPr indent="-342900" lvl="0" marL="457200" rtl="0" algn="l">
+            <a:pPr indent="-342900" lvl="0" marL="457200" marR="0" rtl="0" algn="l">
+              <a:lnSpc>
+                <a:spcPct val="115000"/>
+              </a:lnSpc>
               <a:spcBef>
                 <a:spcPts val="0"/>
               </a:spcBef>
@@ -8382,29 +9677,15 @@
             </a:pPr>
             <a:r>
               <a:rPr lang="en"/>
-              <a:t>Find Server</a:t>
+              <a:t>Complete database design (Early November)</a:t>
             </a:r>
             <a:endParaRPr/>
           </a:p>
           <a:p>
-            <a:pPr indent="-317500" lvl="1" marL="914400" rtl="0" algn="l">
-              <a:spcBef>
-                <a:spcPts val="0"/>
-              </a:spcBef>
-              <a:spcAft>
-                <a:spcPts val="0"/>
-              </a:spcAft>
-              <a:buSzPts val="1400"/>
-              <a:buChar char="❏"/>
-            </a:pPr>
-            <a:r>
-              <a:rPr lang="en"/>
-              <a:t>Must be cheap and offer enough storage to handle many PPT presentations</a:t>
-            </a:r>
-            <a:endParaRPr/>
-          </a:p>
-          <a:p>
-            <a:pPr indent="-342900" lvl="0" marL="457200" rtl="0" algn="l">
+            <a:pPr indent="-342900" lvl="0" marL="457200" marR="0" rtl="0" algn="l">
+              <a:lnSpc>
+                <a:spcPct val="115000"/>
+              </a:lnSpc>
               <a:spcBef>
                 <a:spcPts val="0"/>
               </a:spcBef>
@@ -8416,29 +9697,15 @@
             </a:pPr>
             <a:r>
               <a:rPr lang="en"/>
-              <a:t>Create profile system</a:t>
+              <a:t>Complete Dashboard CRUD (Mid November)</a:t>
             </a:r>
             <a:endParaRPr/>
           </a:p>
           <a:p>
-            <a:pPr indent="-317500" lvl="1" marL="914400" rtl="0" algn="l">
-              <a:spcBef>
-                <a:spcPts val="0"/>
-              </a:spcBef>
-              <a:spcAft>
-                <a:spcPts val="0"/>
-              </a:spcAft>
-              <a:buSzPts val="1400"/>
-              <a:buChar char="❏"/>
-            </a:pPr>
-            <a:r>
-              <a:rPr lang="en"/>
-              <a:t>Likely use CRM Software (Still need to learn)</a:t>
-            </a:r>
-            <a:endParaRPr/>
-          </a:p>
-          <a:p>
-            <a:pPr indent="-342900" lvl="0" marL="457200" rtl="0" algn="l">
+            <a:pPr indent="-342900" lvl="0" marL="457200" marR="0" rtl="0" algn="l">
+              <a:lnSpc>
+                <a:spcPct val="115000"/>
+              </a:lnSpc>
               <a:spcBef>
                 <a:spcPts val="0"/>
               </a:spcBef>
@@ -8450,118 +9717,15 @@
             </a:pPr>
             <a:r>
               <a:rPr lang="en"/>
-              <a:t>Create voting system</a:t>
+              <a:t>Complete Inventory Detail Page (Late November)</a:t>
             </a:r>
             <a:endParaRPr/>
           </a:p>
           <a:p>
-            <a:pPr indent="-317500" lvl="1" marL="914400" rtl="0" algn="l">
-              <a:spcBef>
-                <a:spcPts val="0"/>
-              </a:spcBef>
-              <a:spcAft>
-                <a:spcPts val="0"/>
-              </a:spcAft>
-              <a:buSzPts val="1400"/>
-              <a:buChar char="❏"/>
-            </a:pPr>
-            <a:r>
-              <a:rPr lang="en"/>
-              <a:t>Likely Javascript/PHP</a:t>
-            </a:r>
-            <a:endParaRPr/>
-          </a:p>
-        </p:txBody>
-      </p:sp>
-    </p:spTree>
-  </p:cSld>
-  <p:clrMapOvr>
-    <a:masterClrMapping/>
-  </p:clrMapOvr>
-</p:sld>
-</file>
-
-<file path=ppt/slides/slide7.xml><?xml version="1.0" encoding="utf-8"?>
-<p:sld xmlns:a="http://schemas.openxmlformats.org/drawingml/2006/main" xmlns:r="http://schemas.openxmlformats.org/officeDocument/2006/relationships" xmlns:mc="http://schemas.openxmlformats.org/markup-compatibility/2006" xmlns:mv="urn:schemas-microsoft-com:mac:vml" xmlns:p="http://schemas.openxmlformats.org/presentationml/2006/main" xmlns:c="http://schemas.openxmlformats.org/drawingml/2006/chart" xmlns:dgm="http://schemas.openxmlformats.org/drawingml/2006/diagram" xmlns:o="urn:schemas-microsoft-com:office:office" xmlns:v="urn:schemas-microsoft-com:vml" xmlns:pvml="urn:schemas-microsoft-com:office:powerpoint" xmlns:com="http://schemas.openxmlformats.org/drawingml/2006/compatibility" xmlns:p14="http://schemas.microsoft.com/office/powerpoint/2010/main" xmlns:p15="http://schemas.microsoft.com/office/powerpoint/2012/main">
-  <p:cSld>
-    <p:spTree>
-      <p:nvGrpSpPr>
-        <p:cNvPr id="94" name="Shape 94"/>
-        <p:cNvGrpSpPr/>
-        <p:nvPr/>
-      </p:nvGrpSpPr>
-      <p:grpSpPr>
-        <a:xfrm>
-          <a:off x="0" y="0"/>
-          <a:ext cx="0" cy="0"/>
-          <a:chOff x="0" y="0"/>
-          <a:chExt cx="0" cy="0"/>
-        </a:xfrm>
-      </p:grpSpPr>
-      <p:sp>
-        <p:nvSpPr>
-          <p:cNvPr id="95" name="Google Shape;95;p19"/>
-          <p:cNvSpPr txBox="1"/>
-          <p:nvPr>
-            <p:ph type="title"/>
-          </p:nvPr>
-        </p:nvSpPr>
-        <p:spPr>
-          <a:xfrm>
-            <a:off x="311700" y="391350"/>
-            <a:ext cx="8520600" cy="626100"/>
-          </a:xfrm>
-          <a:prstGeom prst="rect">
-            <a:avLst/>
-          </a:prstGeom>
-        </p:spPr>
-        <p:txBody>
-          <a:bodyPr anchorCtr="0" anchor="t" bIns="91425" lIns="91425" spcFirstLastPara="1" rIns="91425" wrap="square" tIns="91425">
-            <a:noAutofit/>
-          </a:bodyPr>
-          <a:lstStyle/>
-          <a:p>
-            <a:pPr indent="0" lvl="0" marL="0" rtl="0" algn="l">
-              <a:spcBef>
-                <a:spcPts val="0"/>
-              </a:spcBef>
-              <a:spcAft>
-                <a:spcPts val="0"/>
-              </a:spcAft>
-              <a:buNone/>
-            </a:pPr>
-            <a:r>
-              <a:rPr lang="en"/>
-              <a:t>Main Objectives</a:t>
-            </a:r>
-            <a:endParaRPr/>
-          </a:p>
-        </p:txBody>
-      </p:sp>
-      <p:sp>
-        <p:nvSpPr>
-          <p:cNvPr id="96" name="Google Shape;96;p19"/>
-          <p:cNvSpPr txBox="1"/>
-          <p:nvPr>
-            <p:ph idx="1" type="body"/>
-          </p:nvPr>
-        </p:nvSpPr>
-        <p:spPr>
-          <a:xfrm>
-            <a:off x="311700" y="1152475"/>
-            <a:ext cx="8520600" cy="3416400"/>
-          </a:xfrm>
-          <a:prstGeom prst="rect">
-            <a:avLst/>
-          </a:prstGeom>
-        </p:spPr>
-        <p:txBody>
-          <a:bodyPr anchorCtr="0" anchor="t" bIns="91425" lIns="91425" spcFirstLastPara="1" rIns="91425" wrap="square" tIns="91425">
-            <a:noAutofit/>
-          </a:bodyPr>
-          <a:lstStyle/>
-          <a:p>
-            <a:pPr indent="-342900" lvl="0" marL="457200" rtl="0" algn="l">
+            <a:pPr indent="-342900" lvl="0" marL="457200" marR="0" rtl="0" algn="l">
+              <a:lnSpc>
+                <a:spcPct val="115000"/>
+              </a:lnSpc>
               <a:spcBef>
                 <a:spcPts val="0"/>
               </a:spcBef>
@@ -8573,46 +9737,15 @@
             </a:pPr>
             <a:r>
               <a:rPr lang="en"/>
-              <a:t>Create database to host content</a:t>
+              <a:t>Complete Front End Design (Late November / Early December)</a:t>
             </a:r>
             <a:endParaRPr/>
           </a:p>
           <a:p>
-            <a:pPr indent="-317500" lvl="1" marL="914400" rtl="0" algn="l">
-              <a:spcBef>
-                <a:spcPts val="0"/>
-              </a:spcBef>
-              <a:spcAft>
-                <a:spcPts val="0"/>
-              </a:spcAft>
-              <a:buSzPts val="1400"/>
-              <a:buChar char="❏"/>
-            </a:pPr>
-            <a:r>
-              <a:rPr lang="en"/>
-              <a:t>MySQL</a:t>
-            </a:r>
-            <a:endParaRPr/>
-          </a:p>
-          <a:p>
-            <a:pPr indent="-317500" lvl="1" marL="914400" rtl="0" algn="l">
-              <a:spcBef>
-                <a:spcPts val="0"/>
-              </a:spcBef>
-              <a:spcAft>
-                <a:spcPts val="0"/>
-              </a:spcAft>
-              <a:buSzPts val="1400"/>
-              <a:buChar char="❏"/>
-            </a:pPr>
-            <a:r>
-              <a:rPr lang="en"/>
-              <a:t>Need to learn about storing different file types</a:t>
-            </a:r>
-            <a:endParaRPr/>
-          </a:p>
-          <a:p>
-            <a:pPr indent="-342900" lvl="0" marL="457200" rtl="0" algn="l">
+            <a:pPr indent="-342900" lvl="0" marL="457200" marR="0" rtl="0" algn="l">
+              <a:lnSpc>
+                <a:spcPct val="115000"/>
+              </a:lnSpc>
               <a:spcBef>
                 <a:spcPts val="0"/>
               </a:spcBef>
@@ -8624,29 +9757,15 @@
             </a:pPr>
             <a:r>
               <a:rPr lang="en"/>
-              <a:t>Create link allowing users to submit content</a:t>
+              <a:t>Testing / Server Tests (Early December)</a:t>
             </a:r>
             <a:endParaRPr/>
           </a:p>
           <a:p>
-            <a:pPr indent="-317500" lvl="1" marL="914400" rtl="0" algn="l">
-              <a:spcBef>
-                <a:spcPts val="0"/>
-              </a:spcBef>
-              <a:spcAft>
-                <a:spcPts val="0"/>
-              </a:spcAft>
-              <a:buSzPts val="1400"/>
-              <a:buChar char="❏"/>
-            </a:pPr>
-            <a:r>
-              <a:rPr lang="en"/>
-              <a:t>PHP forms with security and limitations</a:t>
-            </a:r>
-            <a:endParaRPr/>
-          </a:p>
-          <a:p>
-            <a:pPr indent="-342900" lvl="0" marL="457200" rtl="0" algn="l">
+            <a:pPr indent="-342900" lvl="0" marL="457200" marR="0" rtl="0" algn="l">
+              <a:lnSpc>
+                <a:spcPct val="115000"/>
+              </a:lnSpc>
               <a:spcBef>
                 <a:spcPts val="0"/>
               </a:spcBef>
@@ -8658,75 +9777,7 @@
             </a:pPr>
             <a:r>
               <a:rPr lang="en"/>
-              <a:t>Allow viewing/previewing of content online before downloading content</a:t>
-            </a:r>
-            <a:endParaRPr/>
-          </a:p>
-          <a:p>
-            <a:pPr indent="-342900" lvl="0" marL="457200" rtl="0" algn="l">
-              <a:spcBef>
-                <a:spcPts val="0"/>
-              </a:spcBef>
-              <a:spcAft>
-                <a:spcPts val="0"/>
-              </a:spcAft>
-              <a:buSzPts val="1800"/>
-              <a:buChar char="❏"/>
-            </a:pPr>
-            <a:r>
-              <a:rPr lang="en"/>
-              <a:t>Security!!!</a:t>
-            </a:r>
-            <a:endParaRPr/>
-          </a:p>
-          <a:p>
-            <a:pPr indent="-317500" lvl="1" marL="914400" rtl="0" algn="l">
-              <a:spcBef>
-                <a:spcPts val="0"/>
-              </a:spcBef>
-              <a:spcAft>
-                <a:spcPts val="0"/>
-              </a:spcAft>
-              <a:buSzPts val="1400"/>
-              <a:buChar char="❏"/>
-            </a:pPr>
-            <a:r>
-              <a:rPr lang="en"/>
-              <a:t>OWASP top 10</a:t>
-            </a:r>
-            <a:endParaRPr/>
-          </a:p>
-          <a:p>
-            <a:pPr indent="-317500" lvl="1" marL="914400" rtl="0" algn="l">
-              <a:spcBef>
-                <a:spcPts val="0"/>
-              </a:spcBef>
-              <a:spcAft>
-                <a:spcPts val="0"/>
-              </a:spcAft>
-              <a:buSzPts val="1400"/>
-              <a:buChar char="❏"/>
-            </a:pPr>
-            <a:r>
-              <a:rPr lang="en"/>
-              <a:t>NO injections</a:t>
-            </a:r>
-            <a:endParaRPr/>
-          </a:p>
-          <a:p>
-            <a:pPr indent="-317500" lvl="1" marL="914400" rtl="0" algn="l">
-              <a:spcBef>
-                <a:spcPts val="0"/>
-              </a:spcBef>
-              <a:spcAft>
-                <a:spcPts val="0"/>
-              </a:spcAft>
-              <a:buSzPts val="1400"/>
-              <a:buChar char="❏"/>
-            </a:pPr>
-            <a:r>
-              <a:rPr lang="en"/>
-              <a:t>Handling user information / passwords</a:t>
+              <a:t>Full Launch ( Mid December)</a:t>
             </a:r>
             <a:endParaRPr/>
           </a:p>
@@ -8745,7 +9796,7 @@
   <p:cSld>
     <p:spTree>
       <p:nvGrpSpPr>
-        <p:cNvPr id="100" name="Shape 100"/>
+        <p:cNvPr id="105" name="Shape 105"/>
         <p:cNvGrpSpPr/>
         <p:nvPr/>
       </p:nvGrpSpPr>
@@ -8757,1048 +9808,34 @@
           <a:chExt cx="0" cy="0"/>
         </a:xfrm>
       </p:grpSpPr>
-      <p:sp>
-        <p:nvSpPr>
-          <p:cNvPr id="101" name="Google Shape;101;p20"/>
-          <p:cNvSpPr txBox="1"/>
-          <p:nvPr>
-            <p:ph type="title"/>
-          </p:nvPr>
-        </p:nvSpPr>
+      <p:pic>
+        <p:nvPicPr>
+          <p:cNvPr id="106" name="Google Shape;106;p20"/>
+          <p:cNvPicPr preferRelativeResize="0"/>
+          <p:nvPr/>
+        </p:nvPicPr>
+        <p:blipFill>
+          <a:blip r:embed="rId3">
+            <a:alphaModFix/>
+          </a:blip>
+          <a:stretch>
+            <a:fillRect/>
+          </a:stretch>
+        </p:blipFill>
         <p:spPr>
           <a:xfrm>
-            <a:off x="311700" y="391350"/>
-            <a:ext cx="8520600" cy="626100"/>
+            <a:off x="152400" y="152400"/>
+            <a:ext cx="8839200" cy="4309110"/>
           </a:xfrm>
           <a:prstGeom prst="rect">
             <a:avLst/>
           </a:prstGeom>
+          <a:noFill/>
+          <a:ln>
+            <a:noFill/>
+          </a:ln>
         </p:spPr>
-        <p:txBody>
-          <a:bodyPr anchorCtr="0" anchor="t" bIns="91425" lIns="91425" spcFirstLastPara="1" rIns="91425" wrap="square" tIns="91425">
-            <a:noAutofit/>
-          </a:bodyPr>
-          <a:lstStyle/>
-          <a:p>
-            <a:pPr indent="0" lvl="0" marL="0" rtl="0" algn="l">
-              <a:spcBef>
-                <a:spcPts val="0"/>
-              </a:spcBef>
-              <a:spcAft>
-                <a:spcPts val="0"/>
-              </a:spcAft>
-              <a:buNone/>
-            </a:pPr>
-            <a:r>
-              <a:rPr lang="en"/>
-              <a:t>Main Objectives</a:t>
-            </a:r>
-            <a:endParaRPr/>
-          </a:p>
-        </p:txBody>
-      </p:sp>
-      <p:sp>
-        <p:nvSpPr>
-          <p:cNvPr id="102" name="Google Shape;102;p20"/>
-          <p:cNvSpPr txBox="1"/>
-          <p:nvPr>
-            <p:ph idx="1" type="body"/>
-          </p:nvPr>
-        </p:nvSpPr>
-        <p:spPr>
-          <a:xfrm>
-            <a:off x="311700" y="1152475"/>
-            <a:ext cx="8520600" cy="3416400"/>
-          </a:xfrm>
-          <a:prstGeom prst="rect">
-            <a:avLst/>
-          </a:prstGeom>
-        </p:spPr>
-        <p:txBody>
-          <a:bodyPr anchorCtr="0" anchor="t" bIns="91425" lIns="91425" spcFirstLastPara="1" rIns="91425" wrap="square" tIns="91425">
-            <a:noAutofit/>
-          </a:bodyPr>
-          <a:lstStyle/>
-          <a:p>
-            <a:pPr indent="-342900" lvl="0" marL="457200" rtl="0" algn="l">
-              <a:spcBef>
-                <a:spcPts val="0"/>
-              </a:spcBef>
-              <a:spcAft>
-                <a:spcPts val="0"/>
-              </a:spcAft>
-              <a:buSzPts val="1800"/>
-              <a:buChar char="❏"/>
-            </a:pPr>
-            <a:r>
-              <a:rPr lang="en"/>
-              <a:t>Find cooperating veteran-run sponsors to help advertise site and garner interest.</a:t>
-            </a:r>
-            <a:endParaRPr/>
-          </a:p>
-          <a:p>
-            <a:pPr indent="-317500" lvl="1" marL="914400" rtl="0" algn="l">
-              <a:spcBef>
-                <a:spcPts val="0"/>
-              </a:spcBef>
-              <a:spcAft>
-                <a:spcPts val="0"/>
-              </a:spcAft>
-              <a:buSzPts val="1400"/>
-              <a:buChar char="❏"/>
-            </a:pPr>
-            <a:r>
-              <a:rPr lang="en"/>
-              <a:t>Prepare pitch email </a:t>
-            </a:r>
-            <a:endParaRPr/>
-          </a:p>
-          <a:p>
-            <a:pPr indent="0" lvl="0" marL="914400" rtl="0" algn="l">
-              <a:spcBef>
-                <a:spcPts val="1600"/>
-              </a:spcBef>
-              <a:spcAft>
-                <a:spcPts val="1600"/>
-              </a:spcAft>
-              <a:buNone/>
-            </a:pPr>
-            <a:r>
-              <a:rPr lang="en"/>
-              <a:t> </a:t>
-            </a:r>
-            <a:endParaRPr/>
-          </a:p>
-        </p:txBody>
-      </p:sp>
-      <p:graphicFrame>
-        <p:nvGraphicFramePr>
-          <p:cNvPr id="103" name="Google Shape;103;p20"/>
-          <p:cNvGraphicFramePr/>
-          <p:nvPr/>
-        </p:nvGraphicFramePr>
-        <p:xfrm>
-          <a:off x="917225" y="2141350"/>
-          <a:ext cx="3000000" cy="3000000"/>
-        </p:xfrm>
-        <a:graphic>
-          <a:graphicData uri="http://schemas.openxmlformats.org/drawingml/2006/table">
-            <a:tbl>
-              <a:tblPr>
-                <a:noFill/>
-                <a:tableStyleId>{C6544A1B-4013-4595-8E18-159166906CBC}</a:tableStyleId>
-              </a:tblPr>
-              <a:tblGrid>
-                <a:gridCol w="2413000"/>
-                <a:gridCol w="2413000"/>
-                <a:gridCol w="2413000"/>
-              </a:tblGrid>
-              <a:tr h="381000">
-                <a:tc>
-                  <a:txBody>
-                    <a:bodyPr>
-                      <a:noAutofit/>
-                    </a:bodyPr>
-                    <a:lstStyle/>
-                    <a:p>
-                      <a:pPr indent="0" lvl="0" marL="0" rtl="0" algn="l">
-                        <a:spcBef>
-                          <a:spcPts val="0"/>
-                        </a:spcBef>
-                        <a:spcAft>
-                          <a:spcPts val="0"/>
-                        </a:spcAft>
-                        <a:buNone/>
-                      </a:pPr>
-                      <a:r>
-                        <a:rPr lang="en">
-                          <a:latin typeface="Lato"/>
-                          <a:ea typeface="Lato"/>
-                          <a:cs typeface="Lato"/>
-                          <a:sym typeface="Lato"/>
-                        </a:rPr>
-                        <a:t>Black Rifle Coffee Company</a:t>
-                      </a:r>
-                      <a:endParaRPr>
-                        <a:latin typeface="Lato"/>
-                        <a:ea typeface="Lato"/>
-                        <a:cs typeface="Lato"/>
-                        <a:sym typeface="Lato"/>
-                      </a:endParaRPr>
-                    </a:p>
-                  </a:txBody>
-                  <a:tcPr marT="91425" marB="91425" marR="91425" marL="91425">
-                    <a:solidFill>
-                      <a:srgbClr val="FF9900"/>
-                    </a:solidFill>
-                  </a:tcPr>
-                </a:tc>
-                <a:tc>
-                  <a:txBody>
-                    <a:bodyPr>
-                      <a:noAutofit/>
-                    </a:bodyPr>
-                    <a:lstStyle/>
-                    <a:p>
-                      <a:pPr indent="0" lvl="0" marL="0" rtl="0" algn="l">
-                        <a:spcBef>
-                          <a:spcPts val="0"/>
-                        </a:spcBef>
-                        <a:spcAft>
-                          <a:spcPts val="0"/>
-                        </a:spcAft>
-                        <a:buNone/>
-                      </a:pPr>
-                      <a:r>
-                        <a:rPr lang="en">
-                          <a:latin typeface="Lato"/>
-                          <a:ea typeface="Lato"/>
-                          <a:cs typeface="Lato"/>
-                          <a:sym typeface="Lato"/>
-                        </a:rPr>
-                        <a:t>De Espresso Liber</a:t>
-                      </a:r>
-                      <a:endParaRPr>
-                        <a:latin typeface="Lato"/>
-                        <a:ea typeface="Lato"/>
-                        <a:cs typeface="Lato"/>
-                        <a:sym typeface="Lato"/>
-                      </a:endParaRPr>
-                    </a:p>
-                  </a:txBody>
-                  <a:tcPr marT="91425" marB="91425" marR="91425" marL="91425">
-                    <a:solidFill>
-                      <a:srgbClr val="FF9900"/>
-                    </a:solidFill>
-                  </a:tcPr>
-                </a:tc>
-                <a:tc>
-                  <a:txBody>
-                    <a:bodyPr>
-                      <a:noAutofit/>
-                    </a:bodyPr>
-                    <a:lstStyle/>
-                    <a:p>
-                      <a:pPr indent="0" lvl="0" marL="0" rtl="0" algn="l">
-                        <a:spcBef>
-                          <a:spcPts val="0"/>
-                        </a:spcBef>
-                        <a:spcAft>
-                          <a:spcPts val="0"/>
-                        </a:spcAft>
-                        <a:buNone/>
-                      </a:pPr>
-                      <a:r>
-                        <a:rPr lang="en">
-                          <a:latin typeface="Lato"/>
-                          <a:ea typeface="Lato"/>
-                          <a:cs typeface="Lato"/>
-                          <a:sym typeface="Lato"/>
-                        </a:rPr>
-                        <a:t>FOB Brewing</a:t>
-                      </a:r>
-                      <a:endParaRPr>
-                        <a:latin typeface="Lato"/>
-                        <a:ea typeface="Lato"/>
-                        <a:cs typeface="Lato"/>
-                        <a:sym typeface="Lato"/>
-                      </a:endParaRPr>
-                    </a:p>
-                  </a:txBody>
-                  <a:tcPr marT="91425" marB="91425" marR="91425" marL="91425">
-                    <a:solidFill>
-                      <a:srgbClr val="FF9900"/>
-                    </a:solidFill>
-                  </a:tcPr>
-                </a:tc>
-              </a:tr>
-              <a:tr h="381000">
-                <a:tc>
-                  <a:txBody>
-                    <a:bodyPr>
-                      <a:noAutofit/>
-                    </a:bodyPr>
-                    <a:lstStyle/>
-                    <a:p>
-                      <a:pPr indent="0" lvl="0" marL="0" rtl="0" algn="l">
-                        <a:spcBef>
-                          <a:spcPts val="0"/>
-                        </a:spcBef>
-                        <a:spcAft>
-                          <a:spcPts val="0"/>
-                        </a:spcAft>
-                        <a:buNone/>
-                      </a:pPr>
-                      <a:r>
-                        <a:rPr lang="en">
-                          <a:latin typeface="Lato"/>
-                          <a:ea typeface="Lato"/>
-                          <a:cs typeface="Lato"/>
-                          <a:sym typeface="Lato"/>
-                        </a:rPr>
-                        <a:t>Blue Angel Coffee Co</a:t>
-                      </a:r>
-                      <a:endParaRPr>
-                        <a:latin typeface="Lato"/>
-                        <a:ea typeface="Lato"/>
-                        <a:cs typeface="Lato"/>
-                        <a:sym typeface="Lato"/>
-                      </a:endParaRPr>
-                    </a:p>
-                  </a:txBody>
-                  <a:tcPr marT="91425" marB="91425" marR="91425" marL="91425">
-                    <a:solidFill>
-                      <a:srgbClr val="FF9900"/>
-                    </a:solidFill>
-                  </a:tcPr>
-                </a:tc>
-                <a:tc>
-                  <a:txBody>
-                    <a:bodyPr>
-                      <a:noAutofit/>
-                    </a:bodyPr>
-                    <a:lstStyle/>
-                    <a:p>
-                      <a:pPr indent="0" lvl="0" marL="0" rtl="0" algn="l">
-                        <a:spcBef>
-                          <a:spcPts val="0"/>
-                        </a:spcBef>
-                        <a:spcAft>
-                          <a:spcPts val="0"/>
-                        </a:spcAft>
-                        <a:buNone/>
-                      </a:pPr>
-                      <a:r>
-                        <a:rPr lang="en">
-                          <a:latin typeface="Lato"/>
-                          <a:ea typeface="Lato"/>
-                          <a:cs typeface="Lato"/>
-                          <a:sym typeface="Lato"/>
-                        </a:rPr>
-                        <a:t>Lock N Load Coffee</a:t>
-                      </a:r>
-                      <a:endParaRPr>
-                        <a:latin typeface="Lato"/>
-                        <a:ea typeface="Lato"/>
-                        <a:cs typeface="Lato"/>
-                        <a:sym typeface="Lato"/>
-                      </a:endParaRPr>
-                    </a:p>
-                  </a:txBody>
-                  <a:tcPr marT="91425" marB="91425" marR="91425" marL="91425">
-                    <a:solidFill>
-                      <a:srgbClr val="FF9900"/>
-                    </a:solidFill>
-                  </a:tcPr>
-                </a:tc>
-                <a:tc>
-                  <a:txBody>
-                    <a:bodyPr>
-                      <a:noAutofit/>
-                    </a:bodyPr>
-                    <a:lstStyle/>
-                    <a:p>
-                      <a:pPr indent="0" lvl="0" marL="0" rtl="0" algn="l">
-                        <a:spcBef>
-                          <a:spcPts val="0"/>
-                        </a:spcBef>
-                        <a:spcAft>
-                          <a:spcPts val="0"/>
-                        </a:spcAft>
-                        <a:buNone/>
-                      </a:pPr>
-                      <a:r>
-                        <a:rPr lang="en">
-                          <a:latin typeface="Lato"/>
-                          <a:ea typeface="Lato"/>
-                          <a:cs typeface="Lato"/>
-                          <a:sym typeface="Lato"/>
-                        </a:rPr>
-                        <a:t>Alpha Coffee</a:t>
-                      </a:r>
-                      <a:endParaRPr>
-                        <a:latin typeface="Lato"/>
-                        <a:ea typeface="Lato"/>
-                        <a:cs typeface="Lato"/>
-                        <a:sym typeface="Lato"/>
-                      </a:endParaRPr>
-                    </a:p>
-                  </a:txBody>
-                  <a:tcPr marT="91425" marB="91425" marR="91425" marL="91425">
-                    <a:solidFill>
-                      <a:srgbClr val="FF9900"/>
-                    </a:solidFill>
-                  </a:tcPr>
-                </a:tc>
-              </a:tr>
-              <a:tr h="381000">
-                <a:tc>
-                  <a:txBody>
-                    <a:bodyPr>
-                      <a:noAutofit/>
-                    </a:bodyPr>
-                    <a:lstStyle/>
-                    <a:p>
-                      <a:pPr indent="0" lvl="0" marL="0" rtl="0" algn="l">
-                        <a:spcBef>
-                          <a:spcPts val="0"/>
-                        </a:spcBef>
-                        <a:spcAft>
-                          <a:spcPts val="0"/>
-                        </a:spcAft>
-                        <a:buNone/>
-                      </a:pPr>
-                      <a:r>
-                        <a:rPr lang="en">
-                          <a:latin typeface="Lato"/>
-                          <a:ea typeface="Lato"/>
-                          <a:cs typeface="Lato"/>
-                          <a:sym typeface="Lato"/>
-                        </a:rPr>
-                        <a:t>GI Joe Coffee</a:t>
-                      </a:r>
-                      <a:endParaRPr>
-                        <a:latin typeface="Lato"/>
-                        <a:ea typeface="Lato"/>
-                        <a:cs typeface="Lato"/>
-                        <a:sym typeface="Lato"/>
-                      </a:endParaRPr>
-                    </a:p>
-                  </a:txBody>
-                  <a:tcPr marT="91425" marB="91425" marR="91425" marL="91425">
-                    <a:solidFill>
-                      <a:srgbClr val="FF9900"/>
-                    </a:solidFill>
-                  </a:tcPr>
-                </a:tc>
-                <a:tc>
-                  <a:txBody>
-                    <a:bodyPr>
-                      <a:noAutofit/>
-                    </a:bodyPr>
-                    <a:lstStyle/>
-                    <a:p>
-                      <a:pPr indent="0" lvl="0" marL="0" rtl="0" algn="l">
-                        <a:spcBef>
-                          <a:spcPts val="0"/>
-                        </a:spcBef>
-                        <a:spcAft>
-                          <a:spcPts val="0"/>
-                        </a:spcAft>
-                        <a:buNone/>
-                      </a:pPr>
-                      <a:r>
-                        <a:rPr lang="en">
-                          <a:latin typeface="Lato"/>
-                          <a:ea typeface="Lato"/>
-                          <a:cs typeface="Lato"/>
-                          <a:sym typeface="Lato"/>
-                        </a:rPr>
-                        <a:t>Java Jarhead</a:t>
-                      </a:r>
-                      <a:endParaRPr>
-                        <a:latin typeface="Lato"/>
-                        <a:ea typeface="Lato"/>
-                        <a:cs typeface="Lato"/>
-                        <a:sym typeface="Lato"/>
-                      </a:endParaRPr>
-                    </a:p>
-                  </a:txBody>
-                  <a:tcPr marT="91425" marB="91425" marR="91425" marL="91425">
-                    <a:solidFill>
-                      <a:srgbClr val="FF9900"/>
-                    </a:solidFill>
-                  </a:tcPr>
-                </a:tc>
-                <a:tc>
-                  <a:txBody>
-                    <a:bodyPr>
-                      <a:noAutofit/>
-                    </a:bodyPr>
-                    <a:lstStyle/>
-                    <a:p>
-                      <a:pPr indent="0" lvl="0" marL="0" rtl="0" algn="l">
-                        <a:spcBef>
-                          <a:spcPts val="0"/>
-                        </a:spcBef>
-                        <a:spcAft>
-                          <a:spcPts val="0"/>
-                        </a:spcAft>
-                        <a:buNone/>
-                      </a:pPr>
-                      <a:r>
-                        <a:rPr lang="en">
-                          <a:latin typeface="Lato"/>
-                          <a:ea typeface="Lato"/>
-                          <a:cs typeface="Lato"/>
-                          <a:sym typeface="Lato"/>
-                        </a:rPr>
-                        <a:t>Bomb Coffee</a:t>
-                      </a:r>
-                      <a:endParaRPr>
-                        <a:latin typeface="Lato"/>
-                        <a:ea typeface="Lato"/>
-                        <a:cs typeface="Lato"/>
-                        <a:sym typeface="Lato"/>
-                      </a:endParaRPr>
-                    </a:p>
-                  </a:txBody>
-                  <a:tcPr marT="91425" marB="91425" marR="91425" marL="91425">
-                    <a:solidFill>
-                      <a:srgbClr val="FF9900"/>
-                    </a:solidFill>
-                  </a:tcPr>
-                </a:tc>
-              </a:tr>
-              <a:tr h="381000">
-                <a:tc>
-                  <a:txBody>
-                    <a:bodyPr>
-                      <a:noAutofit/>
-                    </a:bodyPr>
-                    <a:lstStyle/>
-                    <a:p>
-                      <a:pPr indent="0" lvl="0" marL="0" rtl="0" algn="l">
-                        <a:spcBef>
-                          <a:spcPts val="0"/>
-                        </a:spcBef>
-                        <a:spcAft>
-                          <a:spcPts val="0"/>
-                        </a:spcAft>
-                        <a:buNone/>
-                      </a:pPr>
-                      <a:r>
-                        <a:rPr lang="en">
-                          <a:latin typeface="Lato"/>
-                          <a:ea typeface="Lato"/>
-                          <a:cs typeface="Lato"/>
-                          <a:sym typeface="Lato"/>
-                        </a:rPr>
-                        <a:t>Victory Coffee</a:t>
-                      </a:r>
-                      <a:endParaRPr>
-                        <a:latin typeface="Lato"/>
-                        <a:ea typeface="Lato"/>
-                        <a:cs typeface="Lato"/>
-                        <a:sym typeface="Lato"/>
-                      </a:endParaRPr>
-                    </a:p>
-                  </a:txBody>
-                  <a:tcPr marT="91425" marB="91425" marR="91425" marL="91425">
-                    <a:solidFill>
-                      <a:srgbClr val="FF9900"/>
-                    </a:solidFill>
-                  </a:tcPr>
-                </a:tc>
-                <a:tc>
-                  <a:txBody>
-                    <a:bodyPr>
-                      <a:noAutofit/>
-                    </a:bodyPr>
-                    <a:lstStyle/>
-                    <a:p>
-                      <a:pPr indent="0" lvl="0" marL="0" rtl="0" algn="l">
-                        <a:spcBef>
-                          <a:spcPts val="0"/>
-                        </a:spcBef>
-                        <a:spcAft>
-                          <a:spcPts val="0"/>
-                        </a:spcAft>
-                        <a:buNone/>
-                      </a:pPr>
-                      <a:r>
-                        <a:rPr lang="en">
-                          <a:latin typeface="Lato"/>
-                          <a:ea typeface="Lato"/>
-                          <a:cs typeface="Lato"/>
-                          <a:sym typeface="Lato"/>
-                        </a:rPr>
-                        <a:t>11b Coffee</a:t>
-                      </a:r>
-                      <a:endParaRPr>
-                        <a:latin typeface="Lato"/>
-                        <a:ea typeface="Lato"/>
-                        <a:cs typeface="Lato"/>
-                        <a:sym typeface="Lato"/>
-                      </a:endParaRPr>
-                    </a:p>
-                  </a:txBody>
-                  <a:tcPr marT="91425" marB="91425" marR="91425" marL="91425">
-                    <a:solidFill>
-                      <a:srgbClr val="FF9900"/>
-                    </a:solidFill>
-                  </a:tcPr>
-                </a:tc>
-                <a:tc>
-                  <a:txBody>
-                    <a:bodyPr>
-                      <a:noAutofit/>
-                    </a:bodyPr>
-                    <a:lstStyle/>
-                    <a:p>
-                      <a:pPr indent="0" lvl="0" marL="0" rtl="0" algn="l">
-                        <a:spcBef>
-                          <a:spcPts val="0"/>
-                        </a:spcBef>
-                        <a:spcAft>
-                          <a:spcPts val="0"/>
-                        </a:spcAft>
-                        <a:buNone/>
-                      </a:pPr>
-                      <a:r>
-                        <a:rPr lang="en">
-                          <a:latin typeface="Lato"/>
-                          <a:ea typeface="Lato"/>
-                          <a:cs typeface="Lato"/>
-                          <a:sym typeface="Lato"/>
-                        </a:rPr>
-                        <a:t>Invader Coffee</a:t>
-                      </a:r>
-                      <a:endParaRPr>
-                        <a:latin typeface="Lato"/>
-                        <a:ea typeface="Lato"/>
-                        <a:cs typeface="Lato"/>
-                        <a:sym typeface="Lato"/>
-                      </a:endParaRPr>
-                    </a:p>
-                  </a:txBody>
-                  <a:tcPr marT="91425" marB="91425" marR="91425" marL="91425">
-                    <a:solidFill>
-                      <a:srgbClr val="FF9900"/>
-                    </a:solidFill>
-                  </a:tcPr>
-                </a:tc>
-              </a:tr>
-              <a:tr h="381000">
-                <a:tc>
-                  <a:txBody>
-                    <a:bodyPr>
-                      <a:noAutofit/>
-                    </a:bodyPr>
-                    <a:lstStyle/>
-                    <a:p>
-                      <a:pPr indent="0" lvl="0" marL="0" rtl="0" algn="l">
-                        <a:spcBef>
-                          <a:spcPts val="0"/>
-                        </a:spcBef>
-                        <a:spcAft>
-                          <a:spcPts val="0"/>
-                        </a:spcAft>
-                        <a:buNone/>
-                      </a:pPr>
-                      <a:r>
-                        <a:rPr lang="en">
-                          <a:latin typeface="Lato"/>
-                          <a:ea typeface="Lato"/>
-                          <a:cs typeface="Lato"/>
-                          <a:sym typeface="Lato"/>
-                        </a:rPr>
-                        <a:t>Nine Line Apparel</a:t>
-                      </a:r>
-                      <a:endParaRPr>
-                        <a:latin typeface="Lato"/>
-                        <a:ea typeface="Lato"/>
-                        <a:cs typeface="Lato"/>
-                        <a:sym typeface="Lato"/>
-                      </a:endParaRPr>
-                    </a:p>
-                  </a:txBody>
-                  <a:tcPr marT="91425" marB="91425" marR="91425" marL="91425">
-                    <a:solidFill>
-                      <a:srgbClr val="FF9900"/>
-                    </a:solidFill>
-                  </a:tcPr>
-                </a:tc>
-                <a:tc>
-                  <a:txBody>
-                    <a:bodyPr>
-                      <a:noAutofit/>
-                    </a:bodyPr>
-                    <a:lstStyle/>
-                    <a:p>
-                      <a:pPr indent="0" lvl="0" marL="0" rtl="0" algn="l">
-                        <a:spcBef>
-                          <a:spcPts val="0"/>
-                        </a:spcBef>
-                        <a:spcAft>
-                          <a:spcPts val="0"/>
-                        </a:spcAft>
-                        <a:buNone/>
-                      </a:pPr>
-                      <a:r>
-                        <a:rPr lang="en">
-                          <a:latin typeface="Lato"/>
-                          <a:ea typeface="Lato"/>
-                          <a:cs typeface="Lato"/>
-                          <a:sym typeface="Lato"/>
-                        </a:rPr>
-                        <a:t>Grunt Style</a:t>
-                      </a:r>
-                      <a:endParaRPr>
-                        <a:latin typeface="Lato"/>
-                        <a:ea typeface="Lato"/>
-                        <a:cs typeface="Lato"/>
-                        <a:sym typeface="Lato"/>
-                      </a:endParaRPr>
-                    </a:p>
-                  </a:txBody>
-                  <a:tcPr marT="91425" marB="91425" marR="91425" marL="91425">
-                    <a:solidFill>
-                      <a:srgbClr val="FF9900"/>
-                    </a:solidFill>
-                  </a:tcPr>
-                </a:tc>
-                <a:tc>
-                  <a:txBody>
-                    <a:bodyPr>
-                      <a:noAutofit/>
-                    </a:bodyPr>
-                    <a:lstStyle/>
-                    <a:p>
-                      <a:pPr indent="0" lvl="0" marL="0" rtl="0" algn="l">
-                        <a:spcBef>
-                          <a:spcPts val="0"/>
-                        </a:spcBef>
-                        <a:spcAft>
-                          <a:spcPts val="0"/>
-                        </a:spcAft>
-                        <a:buNone/>
-                      </a:pPr>
-                      <a:r>
-                        <a:rPr lang="en">
-                          <a:latin typeface="Lato"/>
-                          <a:ea typeface="Lato"/>
-                          <a:cs typeface="Lato"/>
-                          <a:sym typeface="Lato"/>
-                        </a:rPr>
-                        <a:t>Ranger Up</a:t>
-                      </a:r>
-                      <a:endParaRPr>
-                        <a:latin typeface="Lato"/>
-                        <a:ea typeface="Lato"/>
-                        <a:cs typeface="Lato"/>
-                        <a:sym typeface="Lato"/>
-                      </a:endParaRPr>
-                    </a:p>
-                  </a:txBody>
-                  <a:tcPr marT="91425" marB="91425" marR="91425" marL="91425">
-                    <a:solidFill>
-                      <a:srgbClr val="FF9900"/>
-                    </a:solidFill>
-                  </a:tcPr>
-                </a:tc>
-              </a:tr>
-              <a:tr h="381000">
-                <a:tc>
-                  <a:txBody>
-                    <a:bodyPr>
-                      <a:noAutofit/>
-                    </a:bodyPr>
-                    <a:lstStyle/>
-                    <a:p>
-                      <a:pPr indent="0" lvl="0" marL="0" rtl="0" algn="l">
-                        <a:spcBef>
-                          <a:spcPts val="0"/>
-                        </a:spcBef>
-                        <a:spcAft>
-                          <a:spcPts val="0"/>
-                        </a:spcAft>
-                        <a:buNone/>
-                      </a:pPr>
-                      <a:r>
-                        <a:rPr lang="en">
-                          <a:latin typeface="Lato"/>
-                          <a:ea typeface="Lato"/>
-                          <a:cs typeface="Lato"/>
-                          <a:sym typeface="Lato"/>
-                        </a:rPr>
-                        <a:t>Article 15 Clothing</a:t>
-                      </a:r>
-                      <a:endParaRPr>
-                        <a:latin typeface="Lato"/>
-                        <a:ea typeface="Lato"/>
-                        <a:cs typeface="Lato"/>
-                        <a:sym typeface="Lato"/>
-                      </a:endParaRPr>
-                    </a:p>
-                  </a:txBody>
-                  <a:tcPr marT="91425" marB="91425" marR="91425" marL="91425">
-                    <a:solidFill>
-                      <a:srgbClr val="FF9900"/>
-                    </a:solidFill>
-                  </a:tcPr>
-                </a:tc>
-                <a:tc>
-                  <a:txBody>
-                    <a:bodyPr>
-                      <a:noAutofit/>
-                    </a:bodyPr>
-                    <a:lstStyle/>
-                    <a:p>
-                      <a:pPr indent="0" lvl="0" marL="0" rtl="0" algn="l">
-                        <a:spcBef>
-                          <a:spcPts val="0"/>
-                        </a:spcBef>
-                        <a:spcAft>
-                          <a:spcPts val="0"/>
-                        </a:spcAft>
-                        <a:buNone/>
-                      </a:pPr>
-                      <a:r>
-                        <a:rPr lang="en">
-                          <a:latin typeface="Lato"/>
-                          <a:ea typeface="Lato"/>
-                          <a:cs typeface="Lato"/>
-                          <a:sym typeface="Lato"/>
-                        </a:rPr>
-                        <a:t>Combat Iron Apparel</a:t>
-                      </a:r>
-                      <a:endParaRPr>
-                        <a:latin typeface="Lato"/>
-                        <a:ea typeface="Lato"/>
-                        <a:cs typeface="Lato"/>
-                        <a:sym typeface="Lato"/>
-                      </a:endParaRPr>
-                    </a:p>
-                  </a:txBody>
-                  <a:tcPr marT="91425" marB="91425" marR="91425" marL="91425">
-                    <a:solidFill>
-                      <a:srgbClr val="FF9900"/>
-                    </a:solidFill>
-                  </a:tcPr>
-                </a:tc>
-                <a:tc>
-                  <a:txBody>
-                    <a:bodyPr>
-                      <a:noAutofit/>
-                    </a:bodyPr>
-                    <a:lstStyle/>
-                    <a:p>
-                      <a:pPr indent="0" lvl="0" marL="0" rtl="0" algn="l">
-                        <a:spcBef>
-                          <a:spcPts val="0"/>
-                        </a:spcBef>
-                        <a:spcAft>
-                          <a:spcPts val="0"/>
-                        </a:spcAft>
-                        <a:buNone/>
-                      </a:pPr>
-                      <a:r>
-                        <a:rPr lang="en">
-                          <a:latin typeface="Lato"/>
-                          <a:ea typeface="Lato"/>
-                          <a:cs typeface="Lato"/>
-                          <a:sym typeface="Lato"/>
-                        </a:rPr>
-                        <a:t>Valhalla Wear</a:t>
-                      </a:r>
-                      <a:endParaRPr>
-                        <a:latin typeface="Lato"/>
-                        <a:ea typeface="Lato"/>
-                        <a:cs typeface="Lato"/>
-                        <a:sym typeface="Lato"/>
-                      </a:endParaRPr>
-                    </a:p>
-                  </a:txBody>
-                  <a:tcPr marT="91425" marB="91425" marR="91425" marL="91425">
-                    <a:solidFill>
-                      <a:srgbClr val="FF9900"/>
-                    </a:solidFill>
-                  </a:tcPr>
-                </a:tc>
-              </a:tr>
-            </a:tbl>
-          </a:graphicData>
-        </a:graphic>
-      </p:graphicFrame>
-      <p:graphicFrame>
-        <p:nvGraphicFramePr>
-          <p:cNvPr id="104" name="Google Shape;104;p20"/>
-          <p:cNvGraphicFramePr/>
-          <p:nvPr/>
-        </p:nvGraphicFramePr>
-        <p:xfrm>
-          <a:off x="8268275" y="146950"/>
-          <a:ext cx="3000000" cy="3000000"/>
-        </p:xfrm>
-        <a:graphic>
-          <a:graphicData uri="http://schemas.openxmlformats.org/drawingml/2006/table">
-            <a:tbl>
-              <a:tblPr>
-                <a:noFill/>
-                <a:tableStyleId>{C6544A1B-4013-4595-8E18-159166906CBC}</a:tableStyleId>
-              </a:tblPr>
-              <a:tblGrid>
-                <a:gridCol w="875725"/>
-              </a:tblGrid>
-              <a:tr h="388725">
-                <a:tc>
-                  <a:txBody>
-                    <a:bodyPr>
-                      <a:noAutofit/>
-                    </a:bodyPr>
-                    <a:lstStyle/>
-                    <a:p>
-                      <a:pPr indent="0" lvl="0" marL="0" rtl="0" algn="l">
-                        <a:spcBef>
-                          <a:spcPts val="0"/>
-                        </a:spcBef>
-                        <a:spcAft>
-                          <a:spcPts val="0"/>
-                        </a:spcAft>
-                        <a:buNone/>
-                      </a:pPr>
-                      <a:r>
-                        <a:rPr lang="en" sz="1000">
-                          <a:latin typeface="Lato"/>
-                          <a:ea typeface="Lato"/>
-                          <a:cs typeface="Lato"/>
-                          <a:sym typeface="Lato"/>
-                        </a:rPr>
-                        <a:t>Yet to Send</a:t>
-                      </a:r>
-                      <a:endParaRPr sz="1000">
-                        <a:latin typeface="Lato"/>
-                        <a:ea typeface="Lato"/>
-                        <a:cs typeface="Lato"/>
-                        <a:sym typeface="Lato"/>
-                      </a:endParaRPr>
-                    </a:p>
-                  </a:txBody>
-                  <a:tcPr marT="91425" marB="91425" marR="91425" marL="91425">
-                    <a:solidFill>
-                      <a:srgbClr val="FF9900"/>
-                    </a:solidFill>
-                  </a:tcPr>
-                </a:tc>
-              </a:tr>
-              <a:tr h="408100">
-                <a:tc>
-                  <a:txBody>
-                    <a:bodyPr>
-                      <a:noAutofit/>
-                    </a:bodyPr>
-                    <a:lstStyle/>
-                    <a:p>
-                      <a:pPr indent="0" lvl="0" marL="0" rtl="0" algn="l">
-                        <a:spcBef>
-                          <a:spcPts val="0"/>
-                        </a:spcBef>
-                        <a:spcAft>
-                          <a:spcPts val="0"/>
-                        </a:spcAft>
-                        <a:buNone/>
-                      </a:pPr>
-                      <a:r>
-                        <a:rPr lang="en" sz="1000">
-                          <a:latin typeface="Lato"/>
-                          <a:ea typeface="Lato"/>
-                          <a:cs typeface="Lato"/>
-                          <a:sym typeface="Lato"/>
-                        </a:rPr>
-                        <a:t>Sent / Waiting</a:t>
-                      </a:r>
-                      <a:endParaRPr sz="1000">
-                        <a:latin typeface="Lato"/>
-                        <a:ea typeface="Lato"/>
-                        <a:cs typeface="Lato"/>
-                        <a:sym typeface="Lato"/>
-                      </a:endParaRPr>
-                    </a:p>
-                  </a:txBody>
-                  <a:tcPr marT="91425" marB="91425" marR="91425" marL="91425">
-                    <a:solidFill>
-                      <a:srgbClr val="FFFF00"/>
-                    </a:solidFill>
-                  </a:tcPr>
-                </a:tc>
-              </a:tr>
-              <a:tr h="388725">
-                <a:tc>
-                  <a:txBody>
-                    <a:bodyPr>
-                      <a:noAutofit/>
-                    </a:bodyPr>
-                    <a:lstStyle/>
-                    <a:p>
-                      <a:pPr indent="0" lvl="0" marL="0" rtl="0" algn="l">
-                        <a:spcBef>
-                          <a:spcPts val="0"/>
-                        </a:spcBef>
-                        <a:spcAft>
-                          <a:spcPts val="0"/>
-                        </a:spcAft>
-                        <a:buNone/>
-                      </a:pPr>
-                      <a:r>
-                        <a:rPr lang="en" sz="1000">
-                          <a:latin typeface="Lato"/>
-                          <a:ea typeface="Lato"/>
-                          <a:cs typeface="Lato"/>
-                          <a:sym typeface="Lato"/>
-                        </a:rPr>
-                        <a:t>Confirmed</a:t>
-                      </a:r>
-                      <a:endParaRPr sz="1000">
-                        <a:latin typeface="Lato"/>
-                        <a:ea typeface="Lato"/>
-                        <a:cs typeface="Lato"/>
-                        <a:sym typeface="Lato"/>
-                      </a:endParaRPr>
-                    </a:p>
-                  </a:txBody>
-                  <a:tcPr marT="91425" marB="91425" marR="91425" marL="91425">
-                    <a:solidFill>
-                      <a:srgbClr val="00FF00"/>
-                    </a:solidFill>
-                  </a:tcPr>
-                </a:tc>
-              </a:tr>
-              <a:tr h="319675">
-                <a:tc>
-                  <a:txBody>
-                    <a:bodyPr>
-                      <a:noAutofit/>
-                    </a:bodyPr>
-                    <a:lstStyle/>
-                    <a:p>
-                      <a:pPr indent="0" lvl="0" marL="0" rtl="0" algn="l">
-                        <a:spcBef>
-                          <a:spcPts val="0"/>
-                        </a:spcBef>
-                        <a:spcAft>
-                          <a:spcPts val="0"/>
-                        </a:spcAft>
-                        <a:buNone/>
-                      </a:pPr>
-                      <a:r>
-                        <a:rPr lang="en" sz="1000">
-                          <a:latin typeface="Lato"/>
-                          <a:ea typeface="Lato"/>
-                          <a:cs typeface="Lato"/>
-                          <a:sym typeface="Lato"/>
-                        </a:rPr>
-                        <a:t>Denied</a:t>
-                      </a:r>
-                      <a:endParaRPr sz="1000">
-                        <a:latin typeface="Lato"/>
-                        <a:ea typeface="Lato"/>
-                        <a:cs typeface="Lato"/>
-                        <a:sym typeface="Lato"/>
-                      </a:endParaRPr>
-                    </a:p>
-                  </a:txBody>
-                  <a:tcPr marT="91425" marB="91425" marR="91425" marL="91425">
-                    <a:solidFill>
-                      <a:srgbClr val="FF0000"/>
-                    </a:solidFill>
-                  </a:tcPr>
-                </a:tc>
-              </a:tr>
-            </a:tbl>
-          </a:graphicData>
-        </a:graphic>
-      </p:graphicFrame>
+      </p:pic>
     </p:spTree>
   </p:cSld>
   <p:clrMapOvr>
@@ -9812,7 +9849,7 @@
   <p:cSld>
     <p:spTree>
       <p:nvGrpSpPr>
-        <p:cNvPr id="108" name="Shape 108"/>
+        <p:cNvPr id="110" name="Shape 110"/>
         <p:cNvGrpSpPr/>
         <p:nvPr/>
       </p:nvGrpSpPr>
@@ -9824,49 +9861,9 @@
           <a:chExt cx="0" cy="0"/>
         </a:xfrm>
       </p:grpSpPr>
-      <p:sp>
-        <p:nvSpPr>
-          <p:cNvPr id="109" name="Google Shape;109;p21"/>
-          <p:cNvSpPr txBox="1"/>
-          <p:nvPr>
-            <p:ph type="title"/>
-          </p:nvPr>
-        </p:nvSpPr>
-        <p:spPr>
-          <a:xfrm>
-            <a:off x="311700" y="391350"/>
-            <a:ext cx="8520600" cy="626100"/>
-          </a:xfrm>
-          <a:prstGeom prst="rect">
-            <a:avLst/>
-          </a:prstGeom>
-        </p:spPr>
-        <p:txBody>
-          <a:bodyPr anchorCtr="0" anchor="t" bIns="91425" lIns="91425" spcFirstLastPara="1" rIns="91425" wrap="square" tIns="91425">
-            <a:noAutofit/>
-          </a:bodyPr>
-          <a:lstStyle/>
-          <a:p>
-            <a:pPr indent="0" lvl="0" marL="0" rtl="0" algn="l">
-              <a:spcBef>
-                <a:spcPts val="0"/>
-              </a:spcBef>
-              <a:spcAft>
-                <a:spcPts val="0"/>
-              </a:spcAft>
-              <a:buNone/>
-            </a:pPr>
-            <a:r>
-              <a:rPr lang="en"/>
-              <a:t>Inspiration / Visualization</a:t>
-            </a:r>
-            <a:endParaRPr/>
-          </a:p>
-        </p:txBody>
-      </p:sp>
       <p:pic>
         <p:nvPicPr>
-          <p:cNvPr id="110" name="Google Shape;110;p21"/>
+          <p:cNvPr id="111" name="Google Shape;111;p21"/>
           <p:cNvPicPr preferRelativeResize="0"/>
           <p:nvPr/>
         </p:nvPicPr>
@@ -9880,8 +9877,8 @@
         </p:blipFill>
         <p:spPr>
           <a:xfrm>
-            <a:off x="789225" y="1218825"/>
-            <a:ext cx="6970310" cy="3821250"/>
+            <a:off x="152400" y="152400"/>
+            <a:ext cx="8839200" cy="4313714"/>
           </a:xfrm>
           <a:prstGeom prst="rect">
             <a:avLst/>
@@ -9901,6 +9898,285 @@
 </file>
 
 <file path=ppt/theme/theme1.xml><?xml version="1.0" encoding="utf-8"?>
+<a:theme xmlns:a="http://schemas.openxmlformats.org/drawingml/2006/main" xmlns:r="http://schemas.openxmlformats.org/officeDocument/2006/relationships">
+  <a:themeElements>
+    <a:clrScheme name="Default">
+      <a:dk1>
+        <a:srgbClr val="000000"/>
+      </a:dk1>
+      <a:lt1>
+        <a:srgbClr val="FFFFFF"/>
+      </a:lt1>
+      <a:dk2>
+        <a:srgbClr val="158158"/>
+      </a:dk2>
+      <a:lt2>
+        <a:srgbClr val="F3F3F3"/>
+      </a:lt2>
+      <a:accent1>
+        <a:srgbClr val="058DC7"/>
+      </a:accent1>
+      <a:accent2>
+        <a:srgbClr val="50B432"/>
+      </a:accent2>
+      <a:accent3>
+        <a:srgbClr val="ED561B"/>
+      </a:accent3>
+      <a:accent4>
+        <a:srgbClr val="EDEF00"/>
+      </a:accent4>
+      <a:accent5>
+        <a:srgbClr val="24CBE5"/>
+      </a:accent5>
+      <a:accent6>
+        <a:srgbClr val="64E572"/>
+      </a:accent6>
+      <a:hlink>
+        <a:srgbClr val="2200CC"/>
+      </a:hlink>
+      <a:folHlink>
+        <a:srgbClr val="551A8B"/>
+      </a:folHlink>
+    </a:clrScheme>
+    <a:fontScheme name="Office">
+      <a:majorFont>
+        <a:latin typeface="Arial"/>
+        <a:ea typeface=""/>
+        <a:cs typeface=""/>
+        <a:font script="Jpan" typeface="ＭＳ Ｐゴシック"/>
+        <a:font script="Hang" typeface="맑은 고딕"/>
+        <a:font script="Hans" typeface="宋体"/>
+        <a:font script="Hant" typeface="新細明體"/>
+        <a:font script="Arab" typeface="Times New Roman"/>
+        <a:font script="Hebr" typeface="Times New Roman"/>
+        <a:font script="Thai" typeface="Angsana New"/>
+        <a:font script="Ethi" typeface="Nyala"/>
+        <a:font script="Beng" typeface="Vrinda"/>
+        <a:font script="Gujr" typeface="Shruti"/>
+        <a:font script="Khmr" typeface="MoolBoran"/>
+        <a:font script="Knda" typeface="Tunga"/>
+        <a:font script="Guru" typeface="Raavi"/>
+        <a:font script="Cans" typeface="Euphemia"/>
+        <a:font script="Cher" typeface="Plantagenet Cherokee"/>
+        <a:font script="Yiii" typeface="Microsoft Yi Baiti"/>
+        <a:font script="Tibt" typeface="Microsoft Himalaya"/>
+        <a:font script="Thaa" typeface="MV Boli"/>
+        <a:font script="Deva" typeface="Mangal"/>
+        <a:font script="Telu" typeface="Gautami"/>
+        <a:font script="Taml" typeface="Latha"/>
+        <a:font script="Syrc" typeface="Estrangelo Edessa"/>
+        <a:font script="Orya" typeface="Kalinga"/>
+        <a:font script="Mlym" typeface="Kartika"/>
+        <a:font script="Laoo" typeface="DokChampa"/>
+        <a:font script="Sinh" typeface="Iskoola Pota"/>
+        <a:font script="Mong" typeface="Mongolian Baiti"/>
+        <a:font script="Viet" typeface="Times New Roman"/>
+        <a:font script="Uigh" typeface="Microsoft Uighur"/>
+        <a:font script="Geor" typeface="Sylfaen"/>
+      </a:majorFont>
+      <a:minorFont>
+        <a:latin typeface="Arial"/>
+        <a:ea typeface=""/>
+        <a:cs typeface=""/>
+        <a:font script="Jpan" typeface="ＭＳ Ｐゴシック"/>
+        <a:font script="Hang" typeface="맑은 고딕"/>
+        <a:font script="Hans" typeface="宋体"/>
+        <a:font script="Hant" typeface="新細明體"/>
+        <a:font script="Arab" typeface="Arial"/>
+        <a:font script="Hebr" typeface="Arial"/>
+        <a:font script="Thai" typeface="Cordia New"/>
+        <a:font script="Ethi" typeface="Nyala"/>
+        <a:font script="Beng" typeface="Vrinda"/>
+        <a:font script="Gujr" typeface="Shruti"/>
+        <a:font script="Khmr" typeface="DaunPenh"/>
+        <a:font script="Knda" typeface="Tunga"/>
+        <a:font script="Guru" typeface="Raavi"/>
+        <a:font script="Cans" typeface="Euphemia"/>
+        <a:font script="Cher" typeface="Plantagenet Cherokee"/>
+        <a:font script="Yiii" typeface="Microsoft Yi Baiti"/>
+        <a:font script="Tibt" typeface="Microsoft Himalaya"/>
+        <a:font script="Thaa" typeface="MV Boli"/>
+        <a:font script="Deva" typeface="Mangal"/>
+        <a:font script="Telu" typeface="Gautami"/>
+        <a:font script="Taml" typeface="Latha"/>
+        <a:font script="Syrc" typeface="Estrangelo Edessa"/>
+        <a:font script="Orya" typeface="Kalinga"/>
+        <a:font script="Mlym" typeface="Kartika"/>
+        <a:font script="Laoo" typeface="DokChampa"/>
+        <a:font script="Sinh" typeface="Iskoola Pota"/>
+        <a:font script="Mong" typeface="Mongolian Baiti"/>
+        <a:font script="Viet" typeface="Arial"/>
+        <a:font script="Uigh" typeface="Microsoft Uighur"/>
+        <a:font script="Geor" typeface="Sylfaen"/>
+      </a:minorFont>
+    </a:fontScheme>
+    <a:fmtScheme name="Office">
+      <a:fillStyleLst>
+        <a:solidFill>
+          <a:schemeClr val="phClr"/>
+        </a:solidFill>
+        <a:gradFill rotWithShape="1">
+          <a:gsLst>
+            <a:gs pos="0">
+              <a:schemeClr val="phClr">
+                <a:tint val="50000"/>
+                <a:satMod val="300000"/>
+              </a:schemeClr>
+            </a:gs>
+            <a:gs pos="35000">
+              <a:schemeClr val="phClr">
+                <a:tint val="37000"/>
+                <a:satMod val="300000"/>
+              </a:schemeClr>
+            </a:gs>
+            <a:gs pos="100000">
+              <a:schemeClr val="phClr">
+                <a:tint val="15000"/>
+                <a:satMod val="350000"/>
+              </a:schemeClr>
+            </a:gs>
+          </a:gsLst>
+          <a:lin ang="16200000" scaled="1"/>
+        </a:gradFill>
+        <a:gradFill rotWithShape="1">
+          <a:gsLst>
+            <a:gs pos="0">
+              <a:schemeClr val="phClr">
+                <a:tint val="100000"/>
+                <a:shade val="100000"/>
+                <a:satMod val="130000"/>
+              </a:schemeClr>
+            </a:gs>
+            <a:gs pos="100000">
+              <a:schemeClr val="phClr">
+                <a:tint val="50000"/>
+                <a:shade val="100000"/>
+                <a:satMod val="350000"/>
+              </a:schemeClr>
+            </a:gs>
+          </a:gsLst>
+          <a:lin ang="16200000" scaled="0"/>
+        </a:gradFill>
+      </a:fillStyleLst>
+      <a:lnStyleLst>
+        <a:ln w="9525" cap="flat" cmpd="sng" algn="ctr">
+          <a:solidFill>
+            <a:schemeClr val="phClr">
+              <a:shade val="95000"/>
+              <a:satMod val="105000"/>
+            </a:schemeClr>
+          </a:solidFill>
+          <a:prstDash val="solid"/>
+        </a:ln>
+        <a:ln w="25400" cap="flat" cmpd="sng" algn="ctr">
+          <a:solidFill>
+            <a:schemeClr val="phClr"/>
+          </a:solidFill>
+          <a:prstDash val="solid"/>
+        </a:ln>
+        <a:ln w="38100" cap="flat" cmpd="sng" algn="ctr">
+          <a:solidFill>
+            <a:schemeClr val="phClr"/>
+          </a:solidFill>
+          <a:prstDash val="solid"/>
+        </a:ln>
+      </a:lnStyleLst>
+      <a:effectStyleLst>
+        <a:effectStyle>
+          <a:effectLst>
+            <a:outerShdw blurRad="40000" dist="20000" dir="5400000" rotWithShape="0">
+              <a:srgbClr val="000000">
+                <a:alpha val="38000"/>
+              </a:srgbClr>
+            </a:outerShdw>
+          </a:effectLst>
+        </a:effectStyle>
+        <a:effectStyle>
+          <a:effectLst>
+            <a:outerShdw blurRad="40000" dist="23000" dir="5400000" rotWithShape="0">
+              <a:srgbClr val="000000">
+                <a:alpha val="35000"/>
+              </a:srgbClr>
+            </a:outerShdw>
+          </a:effectLst>
+        </a:effectStyle>
+        <a:effectStyle>
+          <a:effectLst>
+            <a:outerShdw blurRad="40000" dist="23000" dir="5400000" rotWithShape="0">
+              <a:srgbClr val="000000">
+                <a:alpha val="35000"/>
+              </a:srgbClr>
+            </a:outerShdw>
+          </a:effectLst>
+          <a:scene3d>
+            <a:camera prst="orthographicFront">
+              <a:rot lat="0" lon="0" rev="0"/>
+            </a:camera>
+            <a:lightRig rig="threePt" dir="t">
+              <a:rot lat="0" lon="0" rev="1200000"/>
+            </a:lightRig>
+          </a:scene3d>
+          <a:sp3d>
+            <a:bevelT w="63500" h="25400"/>
+          </a:sp3d>
+        </a:effectStyle>
+      </a:effectStyleLst>
+      <a:bgFillStyleLst>
+        <a:solidFill>
+          <a:schemeClr val="phClr"/>
+        </a:solidFill>
+        <a:gradFill rotWithShape="1">
+          <a:gsLst>
+            <a:gs pos="0">
+              <a:schemeClr val="phClr">
+                <a:tint val="40000"/>
+                <a:satMod val="350000"/>
+              </a:schemeClr>
+            </a:gs>
+            <a:gs pos="40000">
+              <a:schemeClr val="phClr">
+                <a:tint val="45000"/>
+                <a:shade val="99000"/>
+                <a:satMod val="350000"/>
+              </a:schemeClr>
+            </a:gs>
+            <a:gs pos="100000">
+              <a:schemeClr val="phClr">
+                <a:shade val="20000"/>
+                <a:satMod val="255000"/>
+              </a:schemeClr>
+            </a:gs>
+          </a:gsLst>
+          <a:path path="circle">
+            <a:fillToRect l="50000" t="-80000" r="50000" b="180000"/>
+          </a:path>
+        </a:gradFill>
+        <a:gradFill rotWithShape="1">
+          <a:gsLst>
+            <a:gs pos="0">
+              <a:schemeClr val="phClr">
+                <a:tint val="80000"/>
+                <a:satMod val="300000"/>
+              </a:schemeClr>
+            </a:gs>
+            <a:gs pos="100000">
+              <a:schemeClr val="phClr">
+                <a:shade val="30000"/>
+                <a:satMod val="200000"/>
+              </a:schemeClr>
+            </a:gs>
+          </a:gsLst>
+          <a:path path="circle">
+            <a:fillToRect l="50000" t="50000" r="50000" b="50000"/>
+          </a:path>
+        </a:gradFill>
+      </a:bgFillStyleLst>
+    </a:fmtScheme>
+  </a:themeElements>
+</a:theme>
+</file>
+
+<file path=ppt/theme/theme2.xml><?xml version="1.0" encoding="utf-8"?>
 <a:theme xmlns:a="http://schemas.openxmlformats.org/drawingml/2006/main" xmlns:r="http://schemas.openxmlformats.org/officeDocument/2006/relationships" name="Coral">
   <a:themeElements>
     <a:clrScheme name="Coral">
@@ -10177,283 +10453,4 @@
     </a:fmtScheme>
   </a:themeElements>
 </a:theme>
-</file>
-
-<file path=ppt/theme/theme2.xml><?xml version="1.0" encoding="utf-8"?>
-<a:theme xmlns:a="http://schemas.openxmlformats.org/drawingml/2006/main" xmlns:r="http://schemas.openxmlformats.org/officeDocument/2006/relationships">
-  <a:themeElements>
-    <a:clrScheme name="Default">
-      <a:dk1>
-        <a:srgbClr val="000000"/>
-      </a:dk1>
-      <a:lt1>
-        <a:srgbClr val="FFFFFF"/>
-      </a:lt1>
-      <a:dk2>
-        <a:srgbClr val="158158"/>
-      </a:dk2>
-      <a:lt2>
-        <a:srgbClr val="F3F3F3"/>
-      </a:lt2>
-      <a:accent1>
-        <a:srgbClr val="058DC7"/>
-      </a:accent1>
-      <a:accent2>
-        <a:srgbClr val="50B432"/>
-      </a:accent2>
-      <a:accent3>
-        <a:srgbClr val="ED561B"/>
-      </a:accent3>
-      <a:accent4>
-        <a:srgbClr val="EDEF00"/>
-      </a:accent4>
-      <a:accent5>
-        <a:srgbClr val="24CBE5"/>
-      </a:accent5>
-      <a:accent6>
-        <a:srgbClr val="64E572"/>
-      </a:accent6>
-      <a:hlink>
-        <a:srgbClr val="2200CC"/>
-      </a:hlink>
-      <a:folHlink>
-        <a:srgbClr val="551A8B"/>
-      </a:folHlink>
-    </a:clrScheme>
-    <a:fontScheme name="Office">
-      <a:majorFont>
-        <a:latin typeface="Arial"/>
-        <a:ea typeface=""/>
-        <a:cs typeface=""/>
-        <a:font script="Jpan" typeface="ＭＳ Ｐゴシック"/>
-        <a:font script="Hang" typeface="맑은 고딕"/>
-        <a:font script="Hans" typeface="宋体"/>
-        <a:font script="Hant" typeface="新細明體"/>
-        <a:font script="Arab" typeface="Times New Roman"/>
-        <a:font script="Hebr" typeface="Times New Roman"/>
-        <a:font script="Thai" typeface="Angsana New"/>
-        <a:font script="Ethi" typeface="Nyala"/>
-        <a:font script="Beng" typeface="Vrinda"/>
-        <a:font script="Gujr" typeface="Shruti"/>
-        <a:font script="Khmr" typeface="MoolBoran"/>
-        <a:font script="Knda" typeface="Tunga"/>
-        <a:font script="Guru" typeface="Raavi"/>
-        <a:font script="Cans" typeface="Euphemia"/>
-        <a:font script="Cher" typeface="Plantagenet Cherokee"/>
-        <a:font script="Yiii" typeface="Microsoft Yi Baiti"/>
-        <a:font script="Tibt" typeface="Microsoft Himalaya"/>
-        <a:font script="Thaa" typeface="MV Boli"/>
-        <a:font script="Deva" typeface="Mangal"/>
-        <a:font script="Telu" typeface="Gautami"/>
-        <a:font script="Taml" typeface="Latha"/>
-        <a:font script="Syrc" typeface="Estrangelo Edessa"/>
-        <a:font script="Orya" typeface="Kalinga"/>
-        <a:font script="Mlym" typeface="Kartika"/>
-        <a:font script="Laoo" typeface="DokChampa"/>
-        <a:font script="Sinh" typeface="Iskoola Pota"/>
-        <a:font script="Mong" typeface="Mongolian Baiti"/>
-        <a:font script="Viet" typeface="Times New Roman"/>
-        <a:font script="Uigh" typeface="Microsoft Uighur"/>
-        <a:font script="Geor" typeface="Sylfaen"/>
-      </a:majorFont>
-      <a:minorFont>
-        <a:latin typeface="Arial"/>
-        <a:ea typeface=""/>
-        <a:cs typeface=""/>
-        <a:font script="Jpan" typeface="ＭＳ Ｐゴシック"/>
-        <a:font script="Hang" typeface="맑은 고딕"/>
-        <a:font script="Hans" typeface="宋体"/>
-        <a:font script="Hant" typeface="新細明體"/>
-        <a:font script="Arab" typeface="Arial"/>
-        <a:font script="Hebr" typeface="Arial"/>
-        <a:font script="Thai" typeface="Cordia New"/>
-        <a:font script="Ethi" typeface="Nyala"/>
-        <a:font script="Beng" typeface="Vrinda"/>
-        <a:font script="Gujr" typeface="Shruti"/>
-        <a:font script="Khmr" typeface="DaunPenh"/>
-        <a:font script="Knda" typeface="Tunga"/>
-        <a:font script="Guru" typeface="Raavi"/>
-        <a:font script="Cans" typeface="Euphemia"/>
-        <a:font script="Cher" typeface="Plantagenet Cherokee"/>
-        <a:font script="Yiii" typeface="Microsoft Yi Baiti"/>
-        <a:font script="Tibt" typeface="Microsoft Himalaya"/>
-        <a:font script="Thaa" typeface="MV Boli"/>
-        <a:font script="Deva" typeface="Mangal"/>
-        <a:font script="Telu" typeface="Gautami"/>
-        <a:font script="Taml" typeface="Latha"/>
-        <a:font script="Syrc" typeface="Estrangelo Edessa"/>
-        <a:font script="Orya" typeface="Kalinga"/>
-        <a:font script="Mlym" typeface="Kartika"/>
-        <a:font script="Laoo" typeface="DokChampa"/>
-        <a:font script="Sinh" typeface="Iskoola Pota"/>
-        <a:font script="Mong" typeface="Mongolian Baiti"/>
-        <a:font script="Viet" typeface="Arial"/>
-        <a:font script="Uigh" typeface="Microsoft Uighur"/>
-        <a:font script="Geor" typeface="Sylfaen"/>
-      </a:minorFont>
-    </a:fontScheme>
-    <a:fmtScheme name="Office">
-      <a:fillStyleLst>
-        <a:solidFill>
-          <a:schemeClr val="phClr"/>
-        </a:solidFill>
-        <a:gradFill rotWithShape="1">
-          <a:gsLst>
-            <a:gs pos="0">
-              <a:schemeClr val="phClr">
-                <a:tint val="50000"/>
-                <a:satMod val="300000"/>
-              </a:schemeClr>
-            </a:gs>
-            <a:gs pos="35000">
-              <a:schemeClr val="phClr">
-                <a:tint val="37000"/>
-                <a:satMod val="300000"/>
-              </a:schemeClr>
-            </a:gs>
-            <a:gs pos="100000">
-              <a:schemeClr val="phClr">
-                <a:tint val="15000"/>
-                <a:satMod val="350000"/>
-              </a:schemeClr>
-            </a:gs>
-          </a:gsLst>
-          <a:lin ang="16200000" scaled="1"/>
-        </a:gradFill>
-        <a:gradFill rotWithShape="1">
-          <a:gsLst>
-            <a:gs pos="0">
-              <a:schemeClr val="phClr">
-                <a:tint val="100000"/>
-                <a:shade val="100000"/>
-                <a:satMod val="130000"/>
-              </a:schemeClr>
-            </a:gs>
-            <a:gs pos="100000">
-              <a:schemeClr val="phClr">
-                <a:tint val="50000"/>
-                <a:shade val="100000"/>
-                <a:satMod val="350000"/>
-              </a:schemeClr>
-            </a:gs>
-          </a:gsLst>
-          <a:lin ang="16200000" scaled="0"/>
-        </a:gradFill>
-      </a:fillStyleLst>
-      <a:lnStyleLst>
-        <a:ln w="9525" cap="flat" cmpd="sng" algn="ctr">
-          <a:solidFill>
-            <a:schemeClr val="phClr">
-              <a:shade val="95000"/>
-              <a:satMod val="105000"/>
-            </a:schemeClr>
-          </a:solidFill>
-          <a:prstDash val="solid"/>
-        </a:ln>
-        <a:ln w="25400" cap="flat" cmpd="sng" algn="ctr">
-          <a:solidFill>
-            <a:schemeClr val="phClr"/>
-          </a:solidFill>
-          <a:prstDash val="solid"/>
-        </a:ln>
-        <a:ln w="38100" cap="flat" cmpd="sng" algn="ctr">
-          <a:solidFill>
-            <a:schemeClr val="phClr"/>
-          </a:solidFill>
-          <a:prstDash val="solid"/>
-        </a:ln>
-      </a:lnStyleLst>
-      <a:effectStyleLst>
-        <a:effectStyle>
-          <a:effectLst>
-            <a:outerShdw blurRad="40000" dist="20000" dir="5400000" rotWithShape="0">
-              <a:srgbClr val="000000">
-                <a:alpha val="38000"/>
-              </a:srgbClr>
-            </a:outerShdw>
-          </a:effectLst>
-        </a:effectStyle>
-        <a:effectStyle>
-          <a:effectLst>
-            <a:outerShdw blurRad="40000" dist="23000" dir="5400000" rotWithShape="0">
-              <a:srgbClr val="000000">
-                <a:alpha val="35000"/>
-              </a:srgbClr>
-            </a:outerShdw>
-          </a:effectLst>
-        </a:effectStyle>
-        <a:effectStyle>
-          <a:effectLst>
-            <a:outerShdw blurRad="40000" dist="23000" dir="5400000" rotWithShape="0">
-              <a:srgbClr val="000000">
-                <a:alpha val="35000"/>
-              </a:srgbClr>
-            </a:outerShdw>
-          </a:effectLst>
-          <a:scene3d>
-            <a:camera prst="orthographicFront">
-              <a:rot lat="0" lon="0" rev="0"/>
-            </a:camera>
-            <a:lightRig rig="threePt" dir="t">
-              <a:rot lat="0" lon="0" rev="1200000"/>
-            </a:lightRig>
-          </a:scene3d>
-          <a:sp3d>
-            <a:bevelT w="63500" h="25400"/>
-          </a:sp3d>
-        </a:effectStyle>
-      </a:effectStyleLst>
-      <a:bgFillStyleLst>
-        <a:solidFill>
-          <a:schemeClr val="phClr"/>
-        </a:solidFill>
-        <a:gradFill rotWithShape="1">
-          <a:gsLst>
-            <a:gs pos="0">
-              <a:schemeClr val="phClr">
-                <a:tint val="40000"/>
-                <a:satMod val="350000"/>
-              </a:schemeClr>
-            </a:gs>
-            <a:gs pos="40000">
-              <a:schemeClr val="phClr">
-                <a:tint val="45000"/>
-                <a:shade val="99000"/>
-                <a:satMod val="350000"/>
-              </a:schemeClr>
-            </a:gs>
-            <a:gs pos="100000">
-              <a:schemeClr val="phClr">
-                <a:shade val="20000"/>
-                <a:satMod val="255000"/>
-              </a:schemeClr>
-            </a:gs>
-          </a:gsLst>
-          <a:path path="circle">
-            <a:fillToRect l="50000" t="-80000" r="50000" b="180000"/>
-          </a:path>
-        </a:gradFill>
-        <a:gradFill rotWithShape="1">
-          <a:gsLst>
-            <a:gs pos="0">
-              <a:schemeClr val="phClr">
-                <a:tint val="80000"/>
-                <a:satMod val="300000"/>
-              </a:schemeClr>
-            </a:gs>
-            <a:gs pos="100000">
-              <a:schemeClr val="phClr">
-                <a:shade val="30000"/>
-                <a:satMod val="200000"/>
-              </a:schemeClr>
-            </a:gs>
-          </a:gsLst>
-          <a:path path="circle">
-            <a:fillToRect l="50000" t="50000" r="50000" b="50000"/>
-          </a:path>
-        </a:gradFill>
-      </a:bgFillStyleLst>
-    </a:fmtScheme>
-  </a:themeElements>
-</a:theme>
 </file>
</xml_diff>